<commit_message>
Adding more information to the ppt
</commit_message>
<xml_diff>
--- a/DFT finalppt.pptx
+++ b/DFT finalppt.pptx
@@ -6,6 +6,8 @@
   </p:sldMasterIdLst>
   <p:sldIdLst>
     <p:sldId id="256" r:id="rId2"/>
+    <p:sldId id="257" r:id="rId3"/>
+    <p:sldId id="258" r:id="rId4"/>
   </p:sldIdLst>
   <p:sldSz cx="12192000" cy="6858000"/>
   <p:notesSz cx="6858000" cy="9144000"/>
@@ -104,6 +106,11 @@
       </a:defRPr>
     </a:lvl9pPr>
   </p:defaultTextStyle>
+  <p:extLst>
+    <p:ext uri="{EFAFB233-063F-42B5-8137-9DF3F51BA10A}">
+      <p15:sldGuideLst xmlns:p15="http://schemas.microsoft.com/office/powerpoint/2012/main"/>
+    </p:ext>
+  </p:extLst>
 </p:presentation>
 </file>
 
@@ -254,7 +261,7 @@
           <a:p>
             <a:fld id="{A68A2230-04CB-441E-9157-E70EC1ED1AFA}" type="datetimeFigureOut">
               <a:rPr lang="en-US" smtClean="0"/>
-              <a:t>8/6/2020</a:t>
+              <a:t>8/7/2020</a:t>
             </a:fld>
             <a:endParaRPr lang="en-US"/>
           </a:p>
@@ -452,7 +459,7 @@
           <a:p>
             <a:fld id="{A68A2230-04CB-441E-9157-E70EC1ED1AFA}" type="datetimeFigureOut">
               <a:rPr lang="en-US" smtClean="0"/>
-              <a:t>8/6/2020</a:t>
+              <a:t>8/7/2020</a:t>
             </a:fld>
             <a:endParaRPr lang="en-US"/>
           </a:p>
@@ -660,7 +667,7 @@
           <a:p>
             <a:fld id="{A68A2230-04CB-441E-9157-E70EC1ED1AFA}" type="datetimeFigureOut">
               <a:rPr lang="en-US" smtClean="0"/>
-              <a:t>8/6/2020</a:t>
+              <a:t>8/7/2020</a:t>
             </a:fld>
             <a:endParaRPr lang="en-US"/>
           </a:p>
@@ -858,7 +865,7 @@
           <a:p>
             <a:fld id="{A68A2230-04CB-441E-9157-E70EC1ED1AFA}" type="datetimeFigureOut">
               <a:rPr lang="en-US" smtClean="0"/>
-              <a:t>8/6/2020</a:t>
+              <a:t>8/7/2020</a:t>
             </a:fld>
             <a:endParaRPr lang="en-US"/>
           </a:p>
@@ -1133,7 +1140,7 @@
           <a:p>
             <a:fld id="{A68A2230-04CB-441E-9157-E70EC1ED1AFA}" type="datetimeFigureOut">
               <a:rPr lang="en-US" smtClean="0"/>
-              <a:t>8/6/2020</a:t>
+              <a:t>8/7/2020</a:t>
             </a:fld>
             <a:endParaRPr lang="en-US"/>
           </a:p>
@@ -1398,7 +1405,7 @@
           <a:p>
             <a:fld id="{A68A2230-04CB-441E-9157-E70EC1ED1AFA}" type="datetimeFigureOut">
               <a:rPr lang="en-US" smtClean="0"/>
-              <a:t>8/6/2020</a:t>
+              <a:t>8/7/2020</a:t>
             </a:fld>
             <a:endParaRPr lang="en-US"/>
           </a:p>
@@ -1810,7 +1817,7 @@
           <a:p>
             <a:fld id="{A68A2230-04CB-441E-9157-E70EC1ED1AFA}" type="datetimeFigureOut">
               <a:rPr lang="en-US" smtClean="0"/>
-              <a:t>8/6/2020</a:t>
+              <a:t>8/7/2020</a:t>
             </a:fld>
             <a:endParaRPr lang="en-US"/>
           </a:p>
@@ -1951,7 +1958,7 @@
           <a:p>
             <a:fld id="{A68A2230-04CB-441E-9157-E70EC1ED1AFA}" type="datetimeFigureOut">
               <a:rPr lang="en-US" smtClean="0"/>
-              <a:t>8/6/2020</a:t>
+              <a:t>8/7/2020</a:t>
             </a:fld>
             <a:endParaRPr lang="en-US"/>
           </a:p>
@@ -2064,7 +2071,7 @@
           <a:p>
             <a:fld id="{A68A2230-04CB-441E-9157-E70EC1ED1AFA}" type="datetimeFigureOut">
               <a:rPr lang="en-US" smtClean="0"/>
-              <a:t>8/6/2020</a:t>
+              <a:t>8/7/2020</a:t>
             </a:fld>
             <a:endParaRPr lang="en-US"/>
           </a:p>
@@ -2375,7 +2382,7 @@
           <a:p>
             <a:fld id="{A68A2230-04CB-441E-9157-E70EC1ED1AFA}" type="datetimeFigureOut">
               <a:rPr lang="en-US" smtClean="0"/>
-              <a:t>8/6/2020</a:t>
+              <a:t>8/7/2020</a:t>
             </a:fld>
             <a:endParaRPr lang="en-US"/>
           </a:p>
@@ -2663,7 +2670,7 @@
           <a:p>
             <a:fld id="{A68A2230-04CB-441E-9157-E70EC1ED1AFA}" type="datetimeFigureOut">
               <a:rPr lang="en-US" smtClean="0"/>
-              <a:t>8/6/2020</a:t>
+              <a:t>8/7/2020</a:t>
             </a:fld>
             <a:endParaRPr lang="en-US"/>
           </a:p>
@@ -2904,7 +2911,7 @@
           <a:p>
             <a:fld id="{A68A2230-04CB-441E-9157-E70EC1ED1AFA}" type="datetimeFigureOut">
               <a:rPr lang="en-US" smtClean="0"/>
-              <a:t>8/6/2020</a:t>
+              <a:t>8/7/2020</a:t>
             </a:fld>
             <a:endParaRPr lang="en-US"/>
           </a:p>
@@ -3339,10 +3346,15 @@
         </p:nvSpPr>
         <p:spPr/>
         <p:txBody>
-          <a:bodyPr/>
-          <a:lstStyle/>
-          <a:p>
-            <a:endParaRPr lang="en-US"/>
+          <a:bodyPr>
+            <a:normAutofit fontScale="90000"/>
+          </a:bodyPr>
+          <a:lstStyle/>
+          <a:p>
+            <a:r>
+              <a:rPr lang="en-US" dirty="0"/>
+              <a:t>Effects of COVID-19 on the homeless population in the state of California</a:t>
+            </a:r>
           </a:p>
         </p:txBody>
       </p:sp>
@@ -3367,7 +3379,10 @@
           <a:bodyPr/>
           <a:lstStyle/>
           <a:p>
-            <a:endParaRPr lang="en-US"/>
+            <a:r>
+              <a:rPr lang="en-US" dirty="0"/>
+              <a:t>By DFT (Racheal, Elijah and Mark)</a:t>
+            </a:r>
           </a:p>
         </p:txBody>
       </p:sp>
@@ -3375,6 +3390,181 @@
     <p:extLst>
       <p:ext uri="{BB962C8B-B14F-4D97-AF65-F5344CB8AC3E}">
         <p14:creationId xmlns:p14="http://schemas.microsoft.com/office/powerpoint/2010/main" val="2984437094"/>
+      </p:ext>
+    </p:extLst>
+  </p:cSld>
+  <p:clrMapOvr>
+    <a:masterClrMapping/>
+  </p:clrMapOvr>
+</p:sld>
+</file>
+
+<file path=ppt/slides/slide2.xml><?xml version="1.0" encoding="utf-8"?>
+<p:sld xmlns:a="http://schemas.openxmlformats.org/drawingml/2006/main" xmlns:r="http://schemas.openxmlformats.org/officeDocument/2006/relationships" xmlns:p="http://schemas.openxmlformats.org/presentationml/2006/main">
+  <p:cSld>
+    <p:spTree>
+      <p:nvGrpSpPr>
+        <p:cNvPr id="1" name=""/>
+        <p:cNvGrpSpPr/>
+        <p:nvPr/>
+      </p:nvGrpSpPr>
+      <p:grpSpPr>
+        <a:xfrm>
+          <a:off x="0" y="0"/>
+          <a:ext cx="0" cy="0"/>
+          <a:chOff x="0" y="0"/>
+          <a:chExt cx="0" cy="0"/>
+        </a:xfrm>
+      </p:grpSpPr>
+      <p:sp>
+        <p:nvSpPr>
+          <p:cNvPr id="2" name="Title 1">
+            <a:extLst>
+              <a:ext uri="{FF2B5EF4-FFF2-40B4-BE49-F238E27FC236}">
+                <a16:creationId xmlns:a16="http://schemas.microsoft.com/office/drawing/2014/main" id="{8BFC824E-D1EC-4F94-9986-567B20CFA1E4}"/>
+              </a:ext>
+            </a:extLst>
+          </p:cNvPr>
+          <p:cNvSpPr>
+            <a:spLocks noGrp="1"/>
+          </p:cNvSpPr>
+          <p:nvPr>
+            <p:ph type="title"/>
+          </p:nvPr>
+        </p:nvSpPr>
+        <p:spPr/>
+        <p:txBody>
+          <a:bodyPr/>
+          <a:lstStyle/>
+          <a:p>
+            <a:r>
+              <a:rPr lang="en-US" dirty="0"/>
+              <a:t>Overview of the Presentation </a:t>
+            </a:r>
+          </a:p>
+        </p:txBody>
+      </p:sp>
+      <p:sp>
+        <p:nvSpPr>
+          <p:cNvPr id="3" name="Content Placeholder 2">
+            <a:extLst>
+              <a:ext uri="{FF2B5EF4-FFF2-40B4-BE49-F238E27FC236}">
+                <a16:creationId xmlns:a16="http://schemas.microsoft.com/office/drawing/2014/main" id="{EBB3FD2F-9977-4D9A-B6B5-CE9E743E0E66}"/>
+              </a:ext>
+            </a:extLst>
+          </p:cNvPr>
+          <p:cNvSpPr>
+            <a:spLocks noGrp="1"/>
+          </p:cNvSpPr>
+          <p:nvPr>
+            <p:ph idx="1"/>
+          </p:nvPr>
+        </p:nvSpPr>
+        <p:spPr/>
+        <p:txBody>
+          <a:bodyPr/>
+          <a:lstStyle/>
+          <a:p>
+            <a:r>
+              <a:rPr lang="en-US" dirty="0"/>
+              <a:t>What is COVID-19</a:t>
+            </a:r>
+          </a:p>
+          <a:p>
+            <a:r>
+              <a:rPr lang="en-US" dirty="0"/>
+              <a:t>What are the impacts of COVID-19 to the world in General</a:t>
+            </a:r>
+          </a:p>
+        </p:txBody>
+      </p:sp>
+    </p:spTree>
+    <p:extLst>
+      <p:ext uri="{BB962C8B-B14F-4D97-AF65-F5344CB8AC3E}">
+        <p14:creationId xmlns:p14="http://schemas.microsoft.com/office/powerpoint/2010/main" val="4029123039"/>
+      </p:ext>
+    </p:extLst>
+  </p:cSld>
+  <p:clrMapOvr>
+    <a:masterClrMapping/>
+  </p:clrMapOvr>
+</p:sld>
+</file>
+
+<file path=ppt/slides/slide3.xml><?xml version="1.0" encoding="utf-8"?>
+<p:sld xmlns:a="http://schemas.openxmlformats.org/drawingml/2006/main" xmlns:r="http://schemas.openxmlformats.org/officeDocument/2006/relationships" xmlns:p="http://schemas.openxmlformats.org/presentationml/2006/main">
+  <p:cSld>
+    <p:spTree>
+      <p:nvGrpSpPr>
+        <p:cNvPr id="1" name=""/>
+        <p:cNvGrpSpPr/>
+        <p:nvPr/>
+      </p:nvGrpSpPr>
+      <p:grpSpPr>
+        <a:xfrm>
+          <a:off x="0" y="0"/>
+          <a:ext cx="0" cy="0"/>
+          <a:chOff x="0" y="0"/>
+          <a:chExt cx="0" cy="0"/>
+        </a:xfrm>
+      </p:grpSpPr>
+      <p:sp>
+        <p:nvSpPr>
+          <p:cNvPr id="2" name="Title 1">
+            <a:extLst>
+              <a:ext uri="{FF2B5EF4-FFF2-40B4-BE49-F238E27FC236}">
+                <a16:creationId xmlns:a16="http://schemas.microsoft.com/office/drawing/2014/main" id="{34EB9AAA-5BEB-4CE6-AFB1-6C785AB4BE46}"/>
+              </a:ext>
+            </a:extLst>
+          </p:cNvPr>
+          <p:cNvSpPr>
+            <a:spLocks noGrp="1"/>
+          </p:cNvSpPr>
+          <p:nvPr>
+            <p:ph type="title"/>
+          </p:nvPr>
+        </p:nvSpPr>
+        <p:spPr/>
+        <p:txBody>
+          <a:bodyPr/>
+          <a:lstStyle/>
+          <a:p>
+            <a:r>
+              <a:rPr lang="en-US" dirty="0"/>
+              <a:t>What is COVID-19</a:t>
+            </a:r>
+          </a:p>
+        </p:txBody>
+      </p:sp>
+      <p:sp>
+        <p:nvSpPr>
+          <p:cNvPr id="3" name="Content Placeholder 2">
+            <a:extLst>
+              <a:ext uri="{FF2B5EF4-FFF2-40B4-BE49-F238E27FC236}">
+                <a16:creationId xmlns:a16="http://schemas.microsoft.com/office/drawing/2014/main" id="{C3B4F1DA-169B-4AA2-A122-428E66761EDA}"/>
+              </a:ext>
+            </a:extLst>
+          </p:cNvPr>
+          <p:cNvSpPr>
+            <a:spLocks noGrp="1"/>
+          </p:cNvSpPr>
+          <p:nvPr>
+            <p:ph idx="1"/>
+          </p:nvPr>
+        </p:nvSpPr>
+        <p:spPr/>
+        <p:txBody>
+          <a:bodyPr/>
+          <a:lstStyle/>
+          <a:p>
+            <a:endParaRPr lang="en-US"/>
+          </a:p>
+        </p:txBody>
+      </p:sp>
+    </p:spTree>
+    <p:extLst>
+      <p:ext uri="{BB962C8B-B14F-4D97-AF65-F5344CB8AC3E}">
+        <p14:creationId xmlns:p14="http://schemas.microsoft.com/office/powerpoint/2010/main" val="972810180"/>
       </p:ext>
     </p:extLst>
   </p:cSld>

</xml_diff>

<commit_message>
adding to the PPT
</commit_message>
<xml_diff>
--- a/DFT finalppt.pptx
+++ b/DFT finalppt.pptx
@@ -8,6 +8,7 @@
     <p:sldId id="256" r:id="rId2"/>
     <p:sldId id="257" r:id="rId3"/>
     <p:sldId id="258" r:id="rId4"/>
+    <p:sldId id="259" r:id="rId5"/>
   </p:sldIdLst>
   <p:sldSz cx="12192000" cy="6858000"/>
   <p:notesSz cx="6858000" cy="9144000"/>
@@ -3524,7 +3525,12 @@
             <p:ph type="title"/>
           </p:nvPr>
         </p:nvSpPr>
-        <p:spPr/>
+        <p:spPr>
+          <a:xfrm>
+            <a:off x="838200" y="0"/>
+            <a:ext cx="10515600" cy="1325563"/>
+          </a:xfrm>
+        </p:spPr>
         <p:txBody>
           <a:bodyPr/>
           <a:lstStyle/>
@@ -3536,28 +3542,183 @@
           </a:p>
         </p:txBody>
       </p:sp>
-      <p:sp>
-        <p:nvSpPr>
-          <p:cNvPr id="3" name="Content Placeholder 2">
-            <a:extLst>
-              <a:ext uri="{FF2B5EF4-FFF2-40B4-BE49-F238E27FC236}">
-                <a16:creationId xmlns:a16="http://schemas.microsoft.com/office/drawing/2014/main" id="{C3B4F1DA-169B-4AA2-A122-428E66761EDA}"/>
-              </a:ext>
-            </a:extLst>
-          </p:cNvPr>
-          <p:cNvSpPr>
-            <a:spLocks noGrp="1"/>
-          </p:cNvSpPr>
+      <p:pic>
+        <p:nvPicPr>
+          <p:cNvPr id="5" name="Content Placeholder 4" descr="A close up of a flower&#10;&#10;Description automatically generated">
+            <a:extLst>
+              <a:ext uri="{FF2B5EF4-FFF2-40B4-BE49-F238E27FC236}">
+                <a16:creationId xmlns:a16="http://schemas.microsoft.com/office/drawing/2014/main" id="{BDCAFEEB-75DC-49D0-B3E3-22E58EFFA359}"/>
+              </a:ext>
+            </a:extLst>
+          </p:cNvPr>
+          <p:cNvPicPr>
+            <a:picLocks noGrp="1" noChangeAspect="1"/>
+          </p:cNvPicPr>
           <p:nvPr>
             <p:ph idx="1"/>
           </p:nvPr>
-        </p:nvSpPr>
-        <p:spPr/>
-        <p:txBody>
-          <a:bodyPr/>
-          <a:lstStyle/>
-          <a:p>
-            <a:endParaRPr lang="en-US"/>
+        </p:nvPicPr>
+        <p:blipFill>
+          <a:blip r:embed="rId2">
+            <a:extLst>
+              <a:ext uri="{BEBA8EAE-BF5A-486C-A8C5-ECC9F3942E4B}">
+                <a14:imgProps xmlns:a14="http://schemas.microsoft.com/office/drawing/2010/main">
+                  <a14:imgLayer r:embed="rId3">
+                    <a14:imgEffect>
+                      <a14:backgroundRemoval t="4177" b="98526" l="2917" r="90000">
+                        <a14:foregroundMark x1="44444" y1="19656" x2="18056" y2="19165"/>
+                        <a14:foregroundMark x1="18056" y1="19165" x2="24583" y2="14988"/>
+                        <a14:foregroundMark x1="24583" y1="14988" x2="17917" y2="16462"/>
+                        <a14:foregroundMark x1="17917" y1="16462" x2="21667" y2="17199"/>
+                        <a14:foregroundMark x1="16806" y1="14988" x2="18056" y2="16953"/>
+                        <a14:foregroundMark x1="14167" y1="18673" x2="18472" y2="18673"/>
+                        <a14:foregroundMark x1="13472" y1="16462" x2="17361" y2="16462"/>
+                        <a14:foregroundMark x1="14028" y1="16216" x2="17778" y2="16216"/>
+                        <a14:foregroundMark x1="22639" y1="18182" x2="26667" y2="18182"/>
+                        <a14:foregroundMark x1="44861" y1="19902" x2="35556" y2="19902"/>
+                        <a14:foregroundMark x1="43611" y1="18182" x2="36667" y2="18182"/>
+                        <a14:foregroundMark x1="42639" y1="17199" x2="38472" y2="17199"/>
+                        <a14:foregroundMark x1="46389" y1="12285" x2="52639" y2="8600"/>
+                        <a14:foregroundMark x1="52639" y1="8600" x2="52778" y2="8600"/>
+                        <a14:foregroundMark x1="45833" y1="7371" x2="49306" y2="5897"/>
+                        <a14:foregroundMark x1="77222" y1="47912" x2="75139" y2="62899"/>
+                        <a14:foregroundMark x1="53333" y1="89681" x2="60000" y2="89681"/>
+                        <a14:foregroundMark x1="60000" y1="89681" x2="65000" y2="89435"/>
+                        <a14:foregroundMark x1="46111" y1="90172" x2="50833" y2="90172"/>
+                        <a14:foregroundMark x1="48056" y1="92383" x2="49583" y2="92383"/>
+                        <a14:foregroundMark x1="83611" y1="53071" x2="84722" y2="59214"/>
+                        <a14:foregroundMark x1="82222" y1="42015" x2="84167" y2="38821"/>
+                        <a14:foregroundMark x1="15833" y1="33415" x2="23889" y2="36364"/>
+                        <a14:foregroundMark x1="15139" y1="49386" x2="22222" y2="50614"/>
+                        <a14:foregroundMark x1="15694" y1="52088" x2="30139" y2="53071"/>
+                        <a14:foregroundMark x1="32083" y1="52580" x2="23889" y2="52580"/>
+                        <a14:foregroundMark x1="22361" y1="37838" x2="34167" y2="38084"/>
+                        <a14:foregroundMark x1="23750" y1="37101" x2="31944" y2="37346"/>
+                        <a14:foregroundMark x1="25833" y1="18182" x2="32222" y2="18182"/>
+                        <a14:foregroundMark x1="32222" y1="18182" x2="26389" y2="19165"/>
+                        <a14:foregroundMark x1="32083" y1="17936" x2="31250" y2="19165"/>
+                        <a14:foregroundMark x1="30942" y1="87469" x2="33056" y2="87469"/>
+                        <a14:foregroundMark x1="9813" y1="95390" x2="10000" y2="95086"/>
+                        <a14:foregroundMark x1="8889" y1="91892" x2="24306" y2="92383"/>
+                        <a14:foregroundMark x1="24306" y1="92383" x2="26111" y2="91155"/>
+                        <a14:foregroundMark x1="7778" y1="87715" x2="15000" y2="87715"/>
+                        <a14:foregroundMark x1="15000" y1="87715" x2="25972" y2="87469"/>
+                        <a14:foregroundMark x1="25972" y1="94349" x2="26944" y2="87715"/>
+                        <a14:foregroundMark x1="26944" y1="86732" x2="28889" y2="86486"/>
+                        <a14:foregroundMark x1="26528" y1="86241" x2="28750" y2="86241"/>
+                        <a14:foregroundMark x1="57222" y1="4177" x2="63889" y2="6388"/>
+                        <a14:foregroundMark x1="63889" y1="6388" x2="58472" y2="4177"/>
+                        <a14:foregroundMark x1="58472" y1="4177" x2="58472" y2="4177"/>
+                        <a14:foregroundMark x1="16806" y1="84767" x2="9722" y2="84767"/>
+                        <a14:foregroundMark x1="9722" y1="84767" x2="16250" y2="84767"/>
+                        <a14:foregroundMark x1="16250" y1="84767" x2="29722" y2="83784"/>
+                        <a14:foregroundMark x1="29722" y1="83784" x2="29722" y2="83784"/>
+                        <a14:foregroundMark x1="29861" y1="84767" x2="30833" y2="96560"/>
+                        <a14:foregroundMark x1="30833" y1="96560" x2="10139" y2="99509"/>
+                        <a14:foregroundMark x1="10139" y1="99509" x2="6389" y2="89435"/>
+                        <a14:foregroundMark x1="6389" y1="89435" x2="9722" y2="83784"/>
+                        <a14:foregroundMark x1="9722" y1="83292" x2="5417" y2="91892"/>
+                        <a14:foregroundMark x1="5417" y1="91892" x2="9861" y2="98771"/>
+                        <a14:foregroundMark x1="7778" y1="85749" x2="8750" y2="90909"/>
+                        <a14:foregroundMark x1="8750" y1="83784" x2="2917" y2="87224"/>
+                        <a14:backgroundMark x1="43447" y1="16865" x2="45556" y2="6143"/>
+                        <a14:backgroundMark x1="49315" y1="5866" x2="52222" y2="5651"/>
+                        <a14:backgroundMark x1="45556" y1="6143" x2="46233" y2="6093"/>
+                        <a14:backgroundMark x1="58345" y1="942" x2="58611" y2="737"/>
+                        <a14:backgroundMark x1="52222" y1="5651" x2="57628" y2="1493"/>
+                        <a14:backgroundMark x1="58611" y1="737" x2="65139" y2="1966"/>
+                        <a14:backgroundMark x1="65139" y1="1966" x2="67778" y2="12531"/>
+                        <a14:backgroundMark x1="67778" y1="12531" x2="74444" y2="8845"/>
+                        <a14:backgroundMark x1="84581" y1="37121" x2="85278" y2="39066"/>
+                        <a14:backgroundMark x1="74444" y1="8845" x2="84292" y2="36314"/>
+                        <a14:backgroundMark x1="85278" y1="39066" x2="81111" y2="47912"/>
+                        <a14:backgroundMark x1="81111" y1="47912" x2="82743" y2="53547"/>
+                        <a14:backgroundMark x1="83776" y1="59732" x2="82361" y2="69533"/>
+                        <a14:backgroundMark x1="82361" y1="69533" x2="81944" y2="68305"/>
+                        <a14:backgroundMark x1="13583" y1="16154" x2="11806" y2="16216"/>
+                        <a14:backgroundMark x1="11806" y1="16216" x2="13441" y2="16550"/>
+                        <a14:backgroundMark x1="3889" y1="18673" x2="1250" y2="74447"/>
+                      </a14:backgroundRemoval>
+                    </a14:imgEffect>
+                  </a14:imgLayer>
+                </a14:imgProps>
+              </a:ext>
+              <a:ext uri="{28A0092B-C50C-407E-A947-70E740481C1C}">
+                <a14:useLocalDpi xmlns:a14="http://schemas.microsoft.com/office/drawing/2010/main" val="0"/>
+              </a:ext>
+            </a:extLst>
+          </a:blip>
+          <a:stretch>
+            <a:fillRect/>
+          </a:stretch>
+        </p:blipFill>
+        <p:spPr>
+          <a:xfrm>
+            <a:off x="5673168" y="1022783"/>
+            <a:ext cx="7517944" cy="4249727"/>
+          </a:xfrm>
+        </p:spPr>
+      </p:pic>
+      <p:sp>
+        <p:nvSpPr>
+          <p:cNvPr id="6" name="TextBox 5">
+            <a:extLst>
+              <a:ext uri="{FF2B5EF4-FFF2-40B4-BE49-F238E27FC236}">
+                <a16:creationId xmlns:a16="http://schemas.microsoft.com/office/drawing/2014/main" id="{83F44E57-163A-440F-9BBE-0BF83A93EAC0}"/>
+              </a:ext>
+            </a:extLst>
+          </p:cNvPr>
+          <p:cNvSpPr txBox="1"/>
+          <p:nvPr/>
+        </p:nvSpPr>
+        <p:spPr>
+          <a:xfrm>
+            <a:off x="731520" y="1083212"/>
+            <a:ext cx="4529797" cy="1200329"/>
+          </a:xfrm>
+          <a:prstGeom prst="rect">
+            <a:avLst/>
+          </a:prstGeom>
+          <a:noFill/>
+        </p:spPr>
+        <p:txBody>
+          <a:bodyPr wrap="square" rtlCol="0">
+            <a:spAutoFit/>
+          </a:bodyPr>
+          <a:lstStyle/>
+          <a:p>
+            <a:r>
+              <a:rPr lang="en-US" dirty="0"/>
+              <a:t>COVID-19 is a kind of </a:t>
+            </a:r>
+            <a:r>
+              <a:rPr lang="en-US" dirty="0" err="1"/>
+              <a:t>cornonavirus</a:t>
+            </a:r>
+            <a:r>
+              <a:rPr lang="en-US" dirty="0"/>
+              <a:t> …</a:t>
+            </a:r>
+          </a:p>
+          <a:p>
+            <a:endParaRPr lang="en-US" dirty="0"/>
+          </a:p>
+          <a:p>
+            <a:r>
+              <a:rPr lang="en-US" dirty="0"/>
+              <a:t>WAIT!! What is a coronavirus?</a:t>
+            </a:r>
+          </a:p>
+          <a:p>
+            <a:r>
+              <a:rPr lang="en-US" dirty="0"/>
+              <a:t>      okay</a:t>
+            </a:r>
+            <a:r>
+              <a:rPr lang="en-US"/>
+              <a:t>, </a:t>
+            </a:r>
+            <a:endParaRPr lang="en-US" dirty="0"/>
           </a:p>
         </p:txBody>
       </p:sp>
@@ -3565,6 +3726,238 @@
     <p:extLst>
       <p:ext uri="{BB962C8B-B14F-4D97-AF65-F5344CB8AC3E}">
         <p14:creationId xmlns:p14="http://schemas.microsoft.com/office/powerpoint/2010/main" val="972810180"/>
+      </p:ext>
+    </p:extLst>
+  </p:cSld>
+  <p:clrMapOvr>
+    <a:masterClrMapping/>
+  </p:clrMapOvr>
+</p:sld>
+</file>
+
+<file path=ppt/slides/slide4.xml><?xml version="1.0" encoding="utf-8"?>
+<p:sld xmlns:a="http://schemas.openxmlformats.org/drawingml/2006/main" xmlns:r="http://schemas.openxmlformats.org/officeDocument/2006/relationships" xmlns:p="http://schemas.openxmlformats.org/presentationml/2006/main">
+  <p:cSld>
+    <p:spTree>
+      <p:nvGrpSpPr>
+        <p:cNvPr id="1" name=""/>
+        <p:cNvGrpSpPr/>
+        <p:nvPr/>
+      </p:nvGrpSpPr>
+      <p:grpSpPr>
+        <a:xfrm>
+          <a:off x="0" y="0"/>
+          <a:ext cx="0" cy="0"/>
+          <a:chOff x="0" y="0"/>
+          <a:chExt cx="0" cy="0"/>
+        </a:xfrm>
+      </p:grpSpPr>
+      <p:sp>
+        <p:nvSpPr>
+          <p:cNvPr id="2" name="Title 1">
+            <a:extLst>
+              <a:ext uri="{FF2B5EF4-FFF2-40B4-BE49-F238E27FC236}">
+                <a16:creationId xmlns:a16="http://schemas.microsoft.com/office/drawing/2014/main" id="{34EB9AAA-5BEB-4CE6-AFB1-6C785AB4BE46}"/>
+              </a:ext>
+            </a:extLst>
+          </p:cNvPr>
+          <p:cNvSpPr>
+            <a:spLocks noGrp="1"/>
+          </p:cNvSpPr>
+          <p:nvPr>
+            <p:ph type="title"/>
+          </p:nvPr>
+        </p:nvSpPr>
+        <p:spPr>
+          <a:xfrm>
+            <a:off x="838200" y="0"/>
+            <a:ext cx="10515600" cy="1325563"/>
+          </a:xfrm>
+        </p:spPr>
+        <p:txBody>
+          <a:bodyPr/>
+          <a:lstStyle/>
+          <a:p>
+            <a:r>
+              <a:rPr lang="en-US" dirty="0"/>
+              <a:t>What is COVID-19</a:t>
+            </a:r>
+          </a:p>
+        </p:txBody>
+      </p:sp>
+      <p:pic>
+        <p:nvPicPr>
+          <p:cNvPr id="5" name="Content Placeholder 4" descr="A close up of a flower&#10;&#10;Description automatically generated">
+            <a:extLst>
+              <a:ext uri="{FF2B5EF4-FFF2-40B4-BE49-F238E27FC236}">
+                <a16:creationId xmlns:a16="http://schemas.microsoft.com/office/drawing/2014/main" id="{BDCAFEEB-75DC-49D0-B3E3-22E58EFFA359}"/>
+              </a:ext>
+            </a:extLst>
+          </p:cNvPr>
+          <p:cNvPicPr>
+            <a:picLocks noGrp="1" noChangeAspect="1"/>
+          </p:cNvPicPr>
+          <p:nvPr>
+            <p:ph idx="1"/>
+          </p:nvPr>
+        </p:nvPicPr>
+        <p:blipFill>
+          <a:blip r:embed="rId2">
+            <a:extLst>
+              <a:ext uri="{BEBA8EAE-BF5A-486C-A8C5-ECC9F3942E4B}">
+                <a14:imgProps xmlns:a14="http://schemas.microsoft.com/office/drawing/2010/main">
+                  <a14:imgLayer r:embed="rId3">
+                    <a14:imgEffect>
+                      <a14:backgroundRemoval t="4177" b="98526" l="2917" r="90000">
+                        <a14:foregroundMark x1="44444" y1="19656" x2="18056" y2="19165"/>
+                        <a14:foregroundMark x1="18056" y1="19165" x2="24583" y2="14988"/>
+                        <a14:foregroundMark x1="24583" y1="14988" x2="17917" y2="16462"/>
+                        <a14:foregroundMark x1="17917" y1="16462" x2="21667" y2="17199"/>
+                        <a14:foregroundMark x1="16806" y1="14988" x2="18056" y2="16953"/>
+                        <a14:foregroundMark x1="14167" y1="18673" x2="18472" y2="18673"/>
+                        <a14:foregroundMark x1="13472" y1="16462" x2="17361" y2="16462"/>
+                        <a14:foregroundMark x1="14028" y1="16216" x2="17778" y2="16216"/>
+                        <a14:foregroundMark x1="22639" y1="18182" x2="26667" y2="18182"/>
+                        <a14:foregroundMark x1="44861" y1="19902" x2="35556" y2="19902"/>
+                        <a14:foregroundMark x1="43611" y1="18182" x2="36667" y2="18182"/>
+                        <a14:foregroundMark x1="42639" y1="17199" x2="38472" y2="17199"/>
+                        <a14:foregroundMark x1="46389" y1="12285" x2="52639" y2="8600"/>
+                        <a14:foregroundMark x1="52639" y1="8600" x2="52778" y2="8600"/>
+                        <a14:foregroundMark x1="45833" y1="7371" x2="49306" y2="5897"/>
+                        <a14:foregroundMark x1="77222" y1="47912" x2="75139" y2="62899"/>
+                        <a14:foregroundMark x1="53333" y1="89681" x2="60000" y2="89681"/>
+                        <a14:foregroundMark x1="60000" y1="89681" x2="65000" y2="89435"/>
+                        <a14:foregroundMark x1="46111" y1="90172" x2="50833" y2="90172"/>
+                        <a14:foregroundMark x1="48056" y1="92383" x2="49583" y2="92383"/>
+                        <a14:foregroundMark x1="83611" y1="53071" x2="84722" y2="59214"/>
+                        <a14:foregroundMark x1="82222" y1="42015" x2="84167" y2="38821"/>
+                        <a14:foregroundMark x1="15833" y1="33415" x2="23889" y2="36364"/>
+                        <a14:foregroundMark x1="15139" y1="49386" x2="22222" y2="50614"/>
+                        <a14:foregroundMark x1="15694" y1="52088" x2="30139" y2="53071"/>
+                        <a14:foregroundMark x1="32083" y1="52580" x2="23889" y2="52580"/>
+                        <a14:foregroundMark x1="22361" y1="37838" x2="34167" y2="38084"/>
+                        <a14:foregroundMark x1="23750" y1="37101" x2="31944" y2="37346"/>
+                        <a14:foregroundMark x1="25833" y1="18182" x2="32222" y2="18182"/>
+                        <a14:foregroundMark x1="32222" y1="18182" x2="26389" y2="19165"/>
+                        <a14:foregroundMark x1="32083" y1="17936" x2="31250" y2="19165"/>
+                        <a14:foregroundMark x1="30942" y1="87469" x2="33056" y2="87469"/>
+                        <a14:foregroundMark x1="9813" y1="95390" x2="10000" y2="95086"/>
+                        <a14:foregroundMark x1="8889" y1="91892" x2="24306" y2="92383"/>
+                        <a14:foregroundMark x1="24306" y1="92383" x2="26111" y2="91155"/>
+                        <a14:foregroundMark x1="7778" y1="87715" x2="15000" y2="87715"/>
+                        <a14:foregroundMark x1="15000" y1="87715" x2="25972" y2="87469"/>
+                        <a14:foregroundMark x1="25972" y1="94349" x2="26944" y2="87715"/>
+                        <a14:foregroundMark x1="26944" y1="86732" x2="28889" y2="86486"/>
+                        <a14:foregroundMark x1="26528" y1="86241" x2="28750" y2="86241"/>
+                        <a14:foregroundMark x1="57222" y1="4177" x2="63889" y2="6388"/>
+                        <a14:foregroundMark x1="63889" y1="6388" x2="58472" y2="4177"/>
+                        <a14:foregroundMark x1="58472" y1="4177" x2="58472" y2="4177"/>
+                        <a14:foregroundMark x1="16806" y1="84767" x2="9722" y2="84767"/>
+                        <a14:foregroundMark x1="9722" y1="84767" x2="16250" y2="84767"/>
+                        <a14:foregroundMark x1="16250" y1="84767" x2="29722" y2="83784"/>
+                        <a14:foregroundMark x1="29722" y1="83784" x2="29722" y2="83784"/>
+                        <a14:foregroundMark x1="29861" y1="84767" x2="30833" y2="96560"/>
+                        <a14:foregroundMark x1="30833" y1="96560" x2="10139" y2="99509"/>
+                        <a14:foregroundMark x1="10139" y1="99509" x2="6389" y2="89435"/>
+                        <a14:foregroundMark x1="6389" y1="89435" x2="9722" y2="83784"/>
+                        <a14:foregroundMark x1="9722" y1="83292" x2="5417" y2="91892"/>
+                        <a14:foregroundMark x1="5417" y1="91892" x2="9861" y2="98771"/>
+                        <a14:foregroundMark x1="7778" y1="85749" x2="8750" y2="90909"/>
+                        <a14:foregroundMark x1="8750" y1="83784" x2="2917" y2="87224"/>
+                        <a14:backgroundMark x1="43447" y1="16865" x2="45556" y2="6143"/>
+                        <a14:backgroundMark x1="49315" y1="5866" x2="52222" y2="5651"/>
+                        <a14:backgroundMark x1="45556" y1="6143" x2="46233" y2="6093"/>
+                        <a14:backgroundMark x1="58345" y1="942" x2="58611" y2="737"/>
+                        <a14:backgroundMark x1="52222" y1="5651" x2="57628" y2="1493"/>
+                        <a14:backgroundMark x1="58611" y1="737" x2="65139" y2="1966"/>
+                        <a14:backgroundMark x1="65139" y1="1966" x2="67778" y2="12531"/>
+                        <a14:backgroundMark x1="67778" y1="12531" x2="74444" y2="8845"/>
+                        <a14:backgroundMark x1="84581" y1="37121" x2="85278" y2="39066"/>
+                        <a14:backgroundMark x1="74444" y1="8845" x2="84292" y2="36314"/>
+                        <a14:backgroundMark x1="85278" y1="39066" x2="81111" y2="47912"/>
+                        <a14:backgroundMark x1="81111" y1="47912" x2="82743" y2="53547"/>
+                        <a14:backgroundMark x1="83776" y1="59732" x2="82361" y2="69533"/>
+                        <a14:backgroundMark x1="82361" y1="69533" x2="81944" y2="68305"/>
+                        <a14:backgroundMark x1="13583" y1="16154" x2="11806" y2="16216"/>
+                        <a14:backgroundMark x1="11806" y1="16216" x2="13441" y2="16550"/>
+                        <a14:backgroundMark x1="3889" y1="18673" x2="1250" y2="74447"/>
+                      </a14:backgroundRemoval>
+                    </a14:imgEffect>
+                  </a14:imgLayer>
+                </a14:imgProps>
+              </a:ext>
+              <a:ext uri="{28A0092B-C50C-407E-A947-70E740481C1C}">
+                <a14:useLocalDpi xmlns:a14="http://schemas.microsoft.com/office/drawing/2010/main" val="0"/>
+              </a:ext>
+            </a:extLst>
+          </a:blip>
+          <a:stretch>
+            <a:fillRect/>
+          </a:stretch>
+        </p:blipFill>
+        <p:spPr>
+          <a:xfrm>
+            <a:off x="5673168" y="1022783"/>
+            <a:ext cx="7517944" cy="4249727"/>
+          </a:xfrm>
+        </p:spPr>
+      </p:pic>
+      <p:sp>
+        <p:nvSpPr>
+          <p:cNvPr id="6" name="TextBox 5">
+            <a:extLst>
+              <a:ext uri="{FF2B5EF4-FFF2-40B4-BE49-F238E27FC236}">
+                <a16:creationId xmlns:a16="http://schemas.microsoft.com/office/drawing/2014/main" id="{83F44E57-163A-440F-9BBE-0BF83A93EAC0}"/>
+              </a:ext>
+            </a:extLst>
+          </p:cNvPr>
+          <p:cNvSpPr txBox="1"/>
+          <p:nvPr/>
+        </p:nvSpPr>
+        <p:spPr>
+          <a:xfrm>
+            <a:off x="731520" y="1083212"/>
+            <a:ext cx="4529797" cy="923330"/>
+          </a:xfrm>
+          <a:prstGeom prst="rect">
+            <a:avLst/>
+          </a:prstGeom>
+          <a:noFill/>
+        </p:spPr>
+        <p:txBody>
+          <a:bodyPr wrap="square" rtlCol="0">
+            <a:spAutoFit/>
+          </a:bodyPr>
+          <a:lstStyle/>
+          <a:p>
+            <a:r>
+              <a:rPr lang="en-US" dirty="0"/>
+              <a:t>COVID-19 is a kind of </a:t>
+            </a:r>
+            <a:r>
+              <a:rPr lang="en-US" dirty="0" err="1"/>
+              <a:t>cornonavirus</a:t>
+            </a:r>
+            <a:r>
+              <a:rPr lang="en-US" dirty="0"/>
+              <a:t> …</a:t>
+            </a:r>
+          </a:p>
+          <a:p>
+            <a:endParaRPr lang="en-US" dirty="0"/>
+          </a:p>
+          <a:p>
+            <a:r>
+              <a:rPr lang="en-US" dirty="0"/>
+              <a:t>WAIT!! What is a coronavirus</a:t>
+            </a:r>
+          </a:p>
+        </p:txBody>
+      </p:sp>
+    </p:spTree>
+    <p:extLst>
+      <p:ext uri="{BB962C8B-B14F-4D97-AF65-F5344CB8AC3E}">
+        <p14:creationId xmlns:p14="http://schemas.microsoft.com/office/powerpoint/2010/main" val="3382649048"/>
       </p:ext>
     </p:extLst>
   </p:cSld>

</xml_diff>

<commit_message>
More covid-19 information to ppt
</commit_message>
<xml_diff>
--- a/DFT finalppt.pptx
+++ b/DFT finalppt.pptx
@@ -4,11 +4,17 @@
   <p:sldMasterIdLst>
     <p:sldMasterId id="2147483648" r:id="rId1"/>
   </p:sldMasterIdLst>
+  <p:notesMasterIdLst>
+    <p:notesMasterId r:id="rId9"/>
+  </p:notesMasterIdLst>
   <p:sldIdLst>
     <p:sldId id="256" r:id="rId2"/>
     <p:sldId id="257" r:id="rId3"/>
     <p:sldId id="258" r:id="rId4"/>
     <p:sldId id="259" r:id="rId5"/>
+    <p:sldId id="261" r:id="rId6"/>
+    <p:sldId id="262" r:id="rId7"/>
+    <p:sldId id="260" r:id="rId8"/>
   </p:sldIdLst>
   <p:sldSz cx="12192000" cy="6858000"/>
   <p:notesSz cx="6858000" cy="9144000"/>
@@ -115,6 +121,547 @@
 </p:presentation>
 </file>
 
+<file path=ppt/commentAuthors.xml><?xml version="1.0" encoding="utf-8"?>
+<p:cmAuthorLst xmlns:a="http://schemas.openxmlformats.org/drawingml/2006/main" xmlns:r="http://schemas.openxmlformats.org/officeDocument/2006/relationships" xmlns:p="http://schemas.openxmlformats.org/presentationml/2006/main">
+  <p:cmAuthor id="1" name="racheal komuhendo" initials="rk" lastIdx="1" clrIdx="0">
+    <p:extLst>
+      <p:ext uri="{19B8F6BF-5375-455C-9EA6-DF929625EA0E}">
+        <p15:presenceInfo xmlns:p15="http://schemas.microsoft.com/office/powerpoint/2012/main" userId="d88a74a741c4251c" providerId="Windows Live"/>
+      </p:ext>
+    </p:extLst>
+  </p:cmAuthor>
+</p:cmAuthorLst>
+</file>
+
+<file path=ppt/notesMasters/notesMaster1.xml><?xml version="1.0" encoding="utf-8"?>
+<p:notesMaster xmlns:a="http://schemas.openxmlformats.org/drawingml/2006/main" xmlns:r="http://schemas.openxmlformats.org/officeDocument/2006/relationships" xmlns:p="http://schemas.openxmlformats.org/presentationml/2006/main">
+  <p:cSld>
+    <p:bg>
+      <p:bgRef idx="1001">
+        <a:schemeClr val="bg1"/>
+      </p:bgRef>
+    </p:bg>
+    <p:spTree>
+      <p:nvGrpSpPr>
+        <p:cNvPr id="1" name=""/>
+        <p:cNvGrpSpPr/>
+        <p:nvPr/>
+      </p:nvGrpSpPr>
+      <p:grpSpPr>
+        <a:xfrm>
+          <a:off x="0" y="0"/>
+          <a:ext cx="0" cy="0"/>
+          <a:chOff x="0" y="0"/>
+          <a:chExt cx="0" cy="0"/>
+        </a:xfrm>
+      </p:grpSpPr>
+      <p:sp>
+        <p:nvSpPr>
+          <p:cNvPr id="2" name="Header Placeholder 1"/>
+          <p:cNvSpPr>
+            <a:spLocks noGrp="1"/>
+          </p:cNvSpPr>
+          <p:nvPr>
+            <p:ph type="hdr" sz="quarter"/>
+          </p:nvPr>
+        </p:nvSpPr>
+        <p:spPr>
+          <a:xfrm>
+            <a:off x="0" y="0"/>
+            <a:ext cx="2971800" cy="458788"/>
+          </a:xfrm>
+          <a:prstGeom prst="rect">
+            <a:avLst/>
+          </a:prstGeom>
+        </p:spPr>
+        <p:txBody>
+          <a:bodyPr vert="horz" lIns="91440" tIns="45720" rIns="91440" bIns="45720" rtlCol="0"/>
+          <a:lstStyle>
+            <a:lvl1pPr algn="l">
+              <a:defRPr sz="1200"/>
+            </a:lvl1pPr>
+          </a:lstStyle>
+          <a:p>
+            <a:endParaRPr lang="en-US"/>
+          </a:p>
+        </p:txBody>
+      </p:sp>
+      <p:sp>
+        <p:nvSpPr>
+          <p:cNvPr id="3" name="Date Placeholder 2"/>
+          <p:cNvSpPr>
+            <a:spLocks noGrp="1"/>
+          </p:cNvSpPr>
+          <p:nvPr>
+            <p:ph type="dt" idx="1"/>
+          </p:nvPr>
+        </p:nvSpPr>
+        <p:spPr>
+          <a:xfrm>
+            <a:off x="3884613" y="0"/>
+            <a:ext cx="2971800" cy="458788"/>
+          </a:xfrm>
+          <a:prstGeom prst="rect">
+            <a:avLst/>
+          </a:prstGeom>
+        </p:spPr>
+        <p:txBody>
+          <a:bodyPr vert="horz" lIns="91440" tIns="45720" rIns="91440" bIns="45720" rtlCol="0"/>
+          <a:lstStyle>
+            <a:lvl1pPr algn="r">
+              <a:defRPr sz="1200"/>
+            </a:lvl1pPr>
+          </a:lstStyle>
+          <a:p>
+            <a:fld id="{96F2C86F-4A2D-4626-A0AA-6F1FB8EFB446}" type="datetimeFigureOut">
+              <a:rPr lang="en-US" smtClean="0"/>
+              <a:t>8/11/2020</a:t>
+            </a:fld>
+            <a:endParaRPr lang="en-US"/>
+          </a:p>
+        </p:txBody>
+      </p:sp>
+      <p:sp>
+        <p:nvSpPr>
+          <p:cNvPr id="4" name="Slide Image Placeholder 3"/>
+          <p:cNvSpPr>
+            <a:spLocks noGrp="1" noRot="1" noChangeAspect="1"/>
+          </p:cNvSpPr>
+          <p:nvPr>
+            <p:ph type="sldImg" idx="2"/>
+          </p:nvPr>
+        </p:nvSpPr>
+        <p:spPr>
+          <a:xfrm>
+            <a:off x="685800" y="1143000"/>
+            <a:ext cx="5486400" cy="3086100"/>
+          </a:xfrm>
+          <a:prstGeom prst="rect">
+            <a:avLst/>
+          </a:prstGeom>
+          <a:noFill/>
+          <a:ln w="12700">
+            <a:solidFill>
+              <a:prstClr val="black"/>
+            </a:solidFill>
+          </a:ln>
+        </p:spPr>
+        <p:txBody>
+          <a:bodyPr vert="horz" lIns="91440" tIns="45720" rIns="91440" bIns="45720" rtlCol="0" anchor="ctr"/>
+          <a:lstStyle/>
+          <a:p>
+            <a:endParaRPr lang="en-US"/>
+          </a:p>
+        </p:txBody>
+      </p:sp>
+      <p:sp>
+        <p:nvSpPr>
+          <p:cNvPr id="5" name="Notes Placeholder 4"/>
+          <p:cNvSpPr>
+            <a:spLocks noGrp="1"/>
+          </p:cNvSpPr>
+          <p:nvPr>
+            <p:ph type="body" sz="quarter" idx="3"/>
+          </p:nvPr>
+        </p:nvSpPr>
+        <p:spPr>
+          <a:xfrm>
+            <a:off x="685800" y="4400550"/>
+            <a:ext cx="5486400" cy="3600450"/>
+          </a:xfrm>
+          <a:prstGeom prst="rect">
+            <a:avLst/>
+          </a:prstGeom>
+        </p:spPr>
+        <p:txBody>
+          <a:bodyPr vert="horz" lIns="91440" tIns="45720" rIns="91440" bIns="45720" rtlCol="0"/>
+          <a:lstStyle/>
+          <a:p>
+            <a:pPr lvl="0"/>
+            <a:r>
+              <a:rPr lang="en-US"/>
+              <a:t>Click to edit Master text styles</a:t>
+            </a:r>
+          </a:p>
+          <a:p>
+            <a:pPr lvl="1"/>
+            <a:r>
+              <a:rPr lang="en-US"/>
+              <a:t>Second level</a:t>
+            </a:r>
+          </a:p>
+          <a:p>
+            <a:pPr lvl="2"/>
+            <a:r>
+              <a:rPr lang="en-US"/>
+              <a:t>Third level</a:t>
+            </a:r>
+          </a:p>
+          <a:p>
+            <a:pPr lvl="3"/>
+            <a:r>
+              <a:rPr lang="en-US"/>
+              <a:t>Fourth level</a:t>
+            </a:r>
+          </a:p>
+          <a:p>
+            <a:pPr lvl="4"/>
+            <a:r>
+              <a:rPr lang="en-US"/>
+              <a:t>Fifth level</a:t>
+            </a:r>
+          </a:p>
+        </p:txBody>
+      </p:sp>
+      <p:sp>
+        <p:nvSpPr>
+          <p:cNvPr id="6" name="Footer Placeholder 5"/>
+          <p:cNvSpPr>
+            <a:spLocks noGrp="1"/>
+          </p:cNvSpPr>
+          <p:nvPr>
+            <p:ph type="ftr" sz="quarter" idx="4"/>
+          </p:nvPr>
+        </p:nvSpPr>
+        <p:spPr>
+          <a:xfrm>
+            <a:off x="0" y="8685213"/>
+            <a:ext cx="2971800" cy="458787"/>
+          </a:xfrm>
+          <a:prstGeom prst="rect">
+            <a:avLst/>
+          </a:prstGeom>
+        </p:spPr>
+        <p:txBody>
+          <a:bodyPr vert="horz" lIns="91440" tIns="45720" rIns="91440" bIns="45720" rtlCol="0" anchor="b"/>
+          <a:lstStyle>
+            <a:lvl1pPr algn="l">
+              <a:defRPr sz="1200"/>
+            </a:lvl1pPr>
+          </a:lstStyle>
+          <a:p>
+            <a:endParaRPr lang="en-US"/>
+          </a:p>
+        </p:txBody>
+      </p:sp>
+      <p:sp>
+        <p:nvSpPr>
+          <p:cNvPr id="7" name="Slide Number Placeholder 6"/>
+          <p:cNvSpPr>
+            <a:spLocks noGrp="1"/>
+          </p:cNvSpPr>
+          <p:nvPr>
+            <p:ph type="sldNum" sz="quarter" idx="5"/>
+          </p:nvPr>
+        </p:nvSpPr>
+        <p:spPr>
+          <a:xfrm>
+            <a:off x="3884613" y="8685213"/>
+            <a:ext cx="2971800" cy="458787"/>
+          </a:xfrm>
+          <a:prstGeom prst="rect">
+            <a:avLst/>
+          </a:prstGeom>
+        </p:spPr>
+        <p:txBody>
+          <a:bodyPr vert="horz" lIns="91440" tIns="45720" rIns="91440" bIns="45720" rtlCol="0" anchor="b"/>
+          <a:lstStyle>
+            <a:lvl1pPr algn="r">
+              <a:defRPr sz="1200"/>
+            </a:lvl1pPr>
+          </a:lstStyle>
+          <a:p>
+            <a:fld id="{9601AF2B-5FCD-47A0-825D-A4952FFF1367}" type="slidenum">
+              <a:rPr lang="en-US" smtClean="0"/>
+              <a:t>‹#›</a:t>
+            </a:fld>
+            <a:endParaRPr lang="en-US"/>
+          </a:p>
+        </p:txBody>
+      </p:sp>
+    </p:spTree>
+    <p:extLst>
+      <p:ext uri="{BB962C8B-B14F-4D97-AF65-F5344CB8AC3E}">
+        <p14:creationId xmlns:p14="http://schemas.microsoft.com/office/powerpoint/2010/main" val="2545382932"/>
+      </p:ext>
+    </p:extLst>
+  </p:cSld>
+  <p:clrMap bg1="lt1" tx1="dk1" bg2="lt2" tx2="dk2" accent1="accent1" accent2="accent2" accent3="accent3" accent4="accent4" accent5="accent5" accent6="accent6" hlink="hlink" folHlink="folHlink"/>
+  <p:notesStyle>
+    <a:lvl1pPr marL="0" algn="l" defTabSz="914400" rtl="0" eaLnBrk="1" latinLnBrk="0" hangingPunct="1">
+      <a:defRPr sz="1200" kern="1200">
+        <a:solidFill>
+          <a:schemeClr val="tx1"/>
+        </a:solidFill>
+        <a:latin typeface="+mn-lt"/>
+        <a:ea typeface="+mn-ea"/>
+        <a:cs typeface="+mn-cs"/>
+      </a:defRPr>
+    </a:lvl1pPr>
+    <a:lvl2pPr marL="457200" algn="l" defTabSz="914400" rtl="0" eaLnBrk="1" latinLnBrk="0" hangingPunct="1">
+      <a:defRPr sz="1200" kern="1200">
+        <a:solidFill>
+          <a:schemeClr val="tx1"/>
+        </a:solidFill>
+        <a:latin typeface="+mn-lt"/>
+        <a:ea typeface="+mn-ea"/>
+        <a:cs typeface="+mn-cs"/>
+      </a:defRPr>
+    </a:lvl2pPr>
+    <a:lvl3pPr marL="914400" algn="l" defTabSz="914400" rtl="0" eaLnBrk="1" latinLnBrk="0" hangingPunct="1">
+      <a:defRPr sz="1200" kern="1200">
+        <a:solidFill>
+          <a:schemeClr val="tx1"/>
+        </a:solidFill>
+        <a:latin typeface="+mn-lt"/>
+        <a:ea typeface="+mn-ea"/>
+        <a:cs typeface="+mn-cs"/>
+      </a:defRPr>
+    </a:lvl3pPr>
+    <a:lvl4pPr marL="1371600" algn="l" defTabSz="914400" rtl="0" eaLnBrk="1" latinLnBrk="0" hangingPunct="1">
+      <a:defRPr sz="1200" kern="1200">
+        <a:solidFill>
+          <a:schemeClr val="tx1"/>
+        </a:solidFill>
+        <a:latin typeface="+mn-lt"/>
+        <a:ea typeface="+mn-ea"/>
+        <a:cs typeface="+mn-cs"/>
+      </a:defRPr>
+    </a:lvl4pPr>
+    <a:lvl5pPr marL="1828800" algn="l" defTabSz="914400" rtl="0" eaLnBrk="1" latinLnBrk="0" hangingPunct="1">
+      <a:defRPr sz="1200" kern="1200">
+        <a:solidFill>
+          <a:schemeClr val="tx1"/>
+        </a:solidFill>
+        <a:latin typeface="+mn-lt"/>
+        <a:ea typeface="+mn-ea"/>
+        <a:cs typeface="+mn-cs"/>
+      </a:defRPr>
+    </a:lvl5pPr>
+    <a:lvl6pPr marL="2286000" algn="l" defTabSz="914400" rtl="0" eaLnBrk="1" latinLnBrk="0" hangingPunct="1">
+      <a:defRPr sz="1200" kern="1200">
+        <a:solidFill>
+          <a:schemeClr val="tx1"/>
+        </a:solidFill>
+        <a:latin typeface="+mn-lt"/>
+        <a:ea typeface="+mn-ea"/>
+        <a:cs typeface="+mn-cs"/>
+      </a:defRPr>
+    </a:lvl6pPr>
+    <a:lvl7pPr marL="2743200" algn="l" defTabSz="914400" rtl="0" eaLnBrk="1" latinLnBrk="0" hangingPunct="1">
+      <a:defRPr sz="1200" kern="1200">
+        <a:solidFill>
+          <a:schemeClr val="tx1"/>
+        </a:solidFill>
+        <a:latin typeface="+mn-lt"/>
+        <a:ea typeface="+mn-ea"/>
+        <a:cs typeface="+mn-cs"/>
+      </a:defRPr>
+    </a:lvl7pPr>
+    <a:lvl8pPr marL="3200400" algn="l" defTabSz="914400" rtl="0" eaLnBrk="1" latinLnBrk="0" hangingPunct="1">
+      <a:defRPr sz="1200" kern="1200">
+        <a:solidFill>
+          <a:schemeClr val="tx1"/>
+        </a:solidFill>
+        <a:latin typeface="+mn-lt"/>
+        <a:ea typeface="+mn-ea"/>
+        <a:cs typeface="+mn-cs"/>
+      </a:defRPr>
+    </a:lvl8pPr>
+    <a:lvl9pPr marL="3657600" algn="l" defTabSz="914400" rtl="0" eaLnBrk="1" latinLnBrk="0" hangingPunct="1">
+      <a:defRPr sz="1200" kern="1200">
+        <a:solidFill>
+          <a:schemeClr val="tx1"/>
+        </a:solidFill>
+        <a:latin typeface="+mn-lt"/>
+        <a:ea typeface="+mn-ea"/>
+        <a:cs typeface="+mn-cs"/>
+      </a:defRPr>
+    </a:lvl9pPr>
+  </p:notesStyle>
+</p:notesMaster>
+</file>
+
+<file path=ppt/notesSlides/notesSlide1.xml><?xml version="1.0" encoding="utf-8"?>
+<p:notes xmlns:a="http://schemas.openxmlformats.org/drawingml/2006/main" xmlns:r="http://schemas.openxmlformats.org/officeDocument/2006/relationships" xmlns:p="http://schemas.openxmlformats.org/presentationml/2006/main">
+  <p:cSld>
+    <p:spTree>
+      <p:nvGrpSpPr>
+        <p:cNvPr id="1" name=""/>
+        <p:cNvGrpSpPr/>
+        <p:nvPr/>
+      </p:nvGrpSpPr>
+      <p:grpSpPr>
+        <a:xfrm>
+          <a:off x="0" y="0"/>
+          <a:ext cx="0" cy="0"/>
+          <a:chOff x="0" y="0"/>
+          <a:chExt cx="0" cy="0"/>
+        </a:xfrm>
+      </p:grpSpPr>
+      <p:sp>
+        <p:nvSpPr>
+          <p:cNvPr id="2" name="Slide Image Placeholder 1"/>
+          <p:cNvSpPr>
+            <a:spLocks noGrp="1" noRot="1" noChangeAspect="1"/>
+          </p:cNvSpPr>
+          <p:nvPr>
+            <p:ph type="sldImg"/>
+          </p:nvPr>
+        </p:nvSpPr>
+        <p:spPr/>
+      </p:sp>
+      <p:sp>
+        <p:nvSpPr>
+          <p:cNvPr id="3" name="Notes Placeholder 2"/>
+          <p:cNvSpPr>
+            <a:spLocks noGrp="1"/>
+          </p:cNvSpPr>
+          <p:nvPr>
+            <p:ph type="body" idx="1"/>
+          </p:nvPr>
+        </p:nvSpPr>
+        <p:spPr/>
+        <p:txBody>
+          <a:bodyPr/>
+          <a:lstStyle/>
+          <a:p>
+            <a:endParaRPr lang="en-US" dirty="0"/>
+          </a:p>
+        </p:txBody>
+      </p:sp>
+      <p:sp>
+        <p:nvSpPr>
+          <p:cNvPr id="4" name="Slide Number Placeholder 3"/>
+          <p:cNvSpPr>
+            <a:spLocks noGrp="1"/>
+          </p:cNvSpPr>
+          <p:nvPr>
+            <p:ph type="sldNum" sz="quarter" idx="5"/>
+          </p:nvPr>
+        </p:nvSpPr>
+        <p:spPr/>
+        <p:txBody>
+          <a:bodyPr/>
+          <a:lstStyle/>
+          <a:p>
+            <a:fld id="{9601AF2B-5FCD-47A0-825D-A4952FFF1367}" type="slidenum">
+              <a:rPr lang="en-US" smtClean="0"/>
+              <a:t>2</a:t>
+            </a:fld>
+            <a:endParaRPr lang="en-US"/>
+          </a:p>
+        </p:txBody>
+      </p:sp>
+    </p:spTree>
+    <p:extLst>
+      <p:ext uri="{BB962C8B-B14F-4D97-AF65-F5344CB8AC3E}">
+        <p14:creationId xmlns:p14="http://schemas.microsoft.com/office/powerpoint/2010/main" val="158808143"/>
+      </p:ext>
+    </p:extLst>
+  </p:cSld>
+  <p:clrMapOvr>
+    <a:masterClrMapping/>
+  </p:clrMapOvr>
+</p:notes>
+</file>
+
+<file path=ppt/notesSlides/notesSlide2.xml><?xml version="1.0" encoding="utf-8"?>
+<p:notes xmlns:a="http://schemas.openxmlformats.org/drawingml/2006/main" xmlns:r="http://schemas.openxmlformats.org/officeDocument/2006/relationships" xmlns:p="http://schemas.openxmlformats.org/presentationml/2006/main">
+  <p:cSld>
+    <p:spTree>
+      <p:nvGrpSpPr>
+        <p:cNvPr id="1" name=""/>
+        <p:cNvGrpSpPr/>
+        <p:nvPr/>
+      </p:nvGrpSpPr>
+      <p:grpSpPr>
+        <a:xfrm>
+          <a:off x="0" y="0"/>
+          <a:ext cx="0" cy="0"/>
+          <a:chOff x="0" y="0"/>
+          <a:chExt cx="0" cy="0"/>
+        </a:xfrm>
+      </p:grpSpPr>
+      <p:sp>
+        <p:nvSpPr>
+          <p:cNvPr id="2" name="Slide Image Placeholder 1"/>
+          <p:cNvSpPr>
+            <a:spLocks noGrp="1" noRot="1" noChangeAspect="1"/>
+          </p:cNvSpPr>
+          <p:nvPr>
+            <p:ph type="sldImg"/>
+          </p:nvPr>
+        </p:nvSpPr>
+        <p:spPr/>
+      </p:sp>
+      <p:sp>
+        <p:nvSpPr>
+          <p:cNvPr id="3" name="Notes Placeholder 2"/>
+          <p:cNvSpPr>
+            <a:spLocks noGrp="1"/>
+          </p:cNvSpPr>
+          <p:nvPr>
+            <p:ph type="body" idx="1"/>
+          </p:nvPr>
+        </p:nvSpPr>
+        <p:spPr/>
+        <p:txBody>
+          <a:bodyPr/>
+          <a:lstStyle/>
+          <a:p>
+            <a:r>
+              <a:rPr lang="en-US" dirty="0"/>
+              <a:t>Over 20 million cases,  over 700k death worldwide as of Aug 2020.</a:t>
+            </a:r>
+          </a:p>
+          <a:p>
+            <a:r>
+              <a:rPr lang="en-US" dirty="0"/>
+              <a:t>Every country was affected, in most ways, (economically, financially, socially etc.)</a:t>
+            </a:r>
+          </a:p>
+          <a:p>
+            <a:endParaRPr lang="en-US" dirty="0"/>
+          </a:p>
+        </p:txBody>
+      </p:sp>
+      <p:sp>
+        <p:nvSpPr>
+          <p:cNvPr id="4" name="Slide Number Placeholder 3"/>
+          <p:cNvSpPr>
+            <a:spLocks noGrp="1"/>
+          </p:cNvSpPr>
+          <p:nvPr>
+            <p:ph type="sldNum" sz="quarter" idx="5"/>
+          </p:nvPr>
+        </p:nvSpPr>
+        <p:spPr/>
+        <p:txBody>
+          <a:bodyPr/>
+          <a:lstStyle/>
+          <a:p>
+            <a:fld id="{9601AF2B-5FCD-47A0-825D-A4952FFF1367}" type="slidenum">
+              <a:rPr lang="en-US" smtClean="0"/>
+              <a:t>6</a:t>
+            </a:fld>
+            <a:endParaRPr lang="en-US"/>
+          </a:p>
+        </p:txBody>
+      </p:sp>
+    </p:spTree>
+    <p:extLst>
+      <p:ext uri="{BB962C8B-B14F-4D97-AF65-F5344CB8AC3E}">
+        <p14:creationId xmlns:p14="http://schemas.microsoft.com/office/powerpoint/2010/main" val="2903628274"/>
+      </p:ext>
+    </p:extLst>
+  </p:cSld>
+  <p:clrMapOvr>
+    <a:masterClrMapping/>
+  </p:clrMapOvr>
+</p:notes>
+</file>
+
 <file path=ppt/slideLayouts/slideLayout1.xml><?xml version="1.0" encoding="utf-8"?>
 <p:sldLayout xmlns:a="http://schemas.openxmlformats.org/drawingml/2006/main" xmlns:r="http://schemas.openxmlformats.org/officeDocument/2006/relationships" xmlns:p="http://schemas.openxmlformats.org/presentationml/2006/main" type="title" preserve="1">
   <p:cSld name="Title Slide">
@@ -262,7 +809,7 @@
           <a:p>
             <a:fld id="{A68A2230-04CB-441E-9157-E70EC1ED1AFA}" type="datetimeFigureOut">
               <a:rPr lang="en-US" smtClean="0"/>
-              <a:t>8/7/2020</a:t>
+              <a:t>8/9/2020</a:t>
             </a:fld>
             <a:endParaRPr lang="en-US"/>
           </a:p>
@@ -460,7 +1007,7 @@
           <a:p>
             <a:fld id="{A68A2230-04CB-441E-9157-E70EC1ED1AFA}" type="datetimeFigureOut">
               <a:rPr lang="en-US" smtClean="0"/>
-              <a:t>8/7/2020</a:t>
+              <a:t>8/9/2020</a:t>
             </a:fld>
             <a:endParaRPr lang="en-US"/>
           </a:p>
@@ -668,7 +1215,7 @@
           <a:p>
             <a:fld id="{A68A2230-04CB-441E-9157-E70EC1ED1AFA}" type="datetimeFigureOut">
               <a:rPr lang="en-US" smtClean="0"/>
-              <a:t>8/7/2020</a:t>
+              <a:t>8/9/2020</a:t>
             </a:fld>
             <a:endParaRPr lang="en-US"/>
           </a:p>
@@ -866,7 +1413,7 @@
           <a:p>
             <a:fld id="{A68A2230-04CB-441E-9157-E70EC1ED1AFA}" type="datetimeFigureOut">
               <a:rPr lang="en-US" smtClean="0"/>
-              <a:t>8/7/2020</a:t>
+              <a:t>8/9/2020</a:t>
             </a:fld>
             <a:endParaRPr lang="en-US"/>
           </a:p>
@@ -1141,7 +1688,7 @@
           <a:p>
             <a:fld id="{A68A2230-04CB-441E-9157-E70EC1ED1AFA}" type="datetimeFigureOut">
               <a:rPr lang="en-US" smtClean="0"/>
-              <a:t>8/7/2020</a:t>
+              <a:t>8/9/2020</a:t>
             </a:fld>
             <a:endParaRPr lang="en-US"/>
           </a:p>
@@ -1406,7 +1953,7 @@
           <a:p>
             <a:fld id="{A68A2230-04CB-441E-9157-E70EC1ED1AFA}" type="datetimeFigureOut">
               <a:rPr lang="en-US" smtClean="0"/>
-              <a:t>8/7/2020</a:t>
+              <a:t>8/9/2020</a:t>
             </a:fld>
             <a:endParaRPr lang="en-US"/>
           </a:p>
@@ -1818,7 +2365,7 @@
           <a:p>
             <a:fld id="{A68A2230-04CB-441E-9157-E70EC1ED1AFA}" type="datetimeFigureOut">
               <a:rPr lang="en-US" smtClean="0"/>
-              <a:t>8/7/2020</a:t>
+              <a:t>8/9/2020</a:t>
             </a:fld>
             <a:endParaRPr lang="en-US"/>
           </a:p>
@@ -1959,7 +2506,7 @@
           <a:p>
             <a:fld id="{A68A2230-04CB-441E-9157-E70EC1ED1AFA}" type="datetimeFigureOut">
               <a:rPr lang="en-US" smtClean="0"/>
-              <a:t>8/7/2020</a:t>
+              <a:t>8/9/2020</a:t>
             </a:fld>
             <a:endParaRPr lang="en-US"/>
           </a:p>
@@ -2072,7 +2619,7 @@
           <a:p>
             <a:fld id="{A68A2230-04CB-441E-9157-E70EC1ED1AFA}" type="datetimeFigureOut">
               <a:rPr lang="en-US" smtClean="0"/>
-              <a:t>8/7/2020</a:t>
+              <a:t>8/9/2020</a:t>
             </a:fld>
             <a:endParaRPr lang="en-US"/>
           </a:p>
@@ -2383,7 +2930,7 @@
           <a:p>
             <a:fld id="{A68A2230-04CB-441E-9157-E70EC1ED1AFA}" type="datetimeFigureOut">
               <a:rPr lang="en-US" smtClean="0"/>
-              <a:t>8/7/2020</a:t>
+              <a:t>8/9/2020</a:t>
             </a:fld>
             <a:endParaRPr lang="en-US"/>
           </a:p>
@@ -2671,7 +3218,7 @@
           <a:p>
             <a:fld id="{A68A2230-04CB-441E-9157-E70EC1ED1AFA}" type="datetimeFigureOut">
               <a:rPr lang="en-US" smtClean="0"/>
-              <a:t>8/7/2020</a:t>
+              <a:t>8/9/2020</a:t>
             </a:fld>
             <a:endParaRPr lang="en-US"/>
           </a:p>
@@ -2912,7 +3459,7 @@
           <a:p>
             <a:fld id="{A68A2230-04CB-441E-9157-E70EC1ED1AFA}" type="datetimeFigureOut">
               <a:rPr lang="en-US" smtClean="0"/>
-              <a:t>8/7/2020</a:t>
+              <a:t>8/9/2020</a:t>
             </a:fld>
             <a:endParaRPr lang="en-US"/>
           </a:p>
@@ -3536,7 +4083,7 @@
           <a:lstStyle/>
           <a:p>
             <a:r>
-              <a:rPr lang="en-US" dirty="0"/>
+              <a:rPr lang="en-US" b="1" dirty="0"/>
               <a:t>What is COVID-19</a:t>
             </a:r>
           </a:p>
@@ -3654,8 +4201,8 @@
         </p:blipFill>
         <p:spPr>
           <a:xfrm>
-            <a:off x="5673168" y="1022783"/>
-            <a:ext cx="7517944" cy="4249727"/>
+            <a:off x="5121958" y="1022784"/>
+            <a:ext cx="7933688" cy="4752005"/>
           </a:xfrm>
         </p:spPr>
       </p:pic>
@@ -3673,8 +4220,8 @@
         </p:nvSpPr>
         <p:spPr>
           <a:xfrm>
-            <a:off x="731520" y="1083212"/>
-            <a:ext cx="4529797" cy="1200329"/>
+            <a:off x="315775" y="1022784"/>
+            <a:ext cx="5780225" cy="4893647"/>
           </a:xfrm>
           <a:prstGeom prst="rect">
             <a:avLst/>
@@ -3688,37 +4235,60 @@
           <a:lstStyle/>
           <a:p>
             <a:r>
-              <a:rPr lang="en-US" dirty="0"/>
-              <a:t>COVID-19 is a kind of </a:t>
-            </a:r>
-            <a:r>
-              <a:rPr lang="en-US" dirty="0" err="1"/>
-              <a:t>cornonavirus</a:t>
-            </a:r>
-            <a:r>
-              <a:rPr lang="en-US" dirty="0"/>
-              <a:t> …</a:t>
-            </a:r>
-          </a:p>
-          <a:p>
-            <a:endParaRPr lang="en-US" dirty="0"/>
-          </a:p>
-          <a:p>
-            <a:r>
-              <a:rPr lang="en-US" dirty="0"/>
+              <a:rPr lang="en-US" sz="2400" dirty="0"/>
+              <a:t>COVID-19 is caused by a coronavirus …</a:t>
+            </a:r>
+          </a:p>
+          <a:p>
+            <a:endParaRPr lang="en-US" sz="2400" b="1" dirty="0"/>
+          </a:p>
+          <a:p>
+            <a:r>
+              <a:rPr lang="en-US" sz="2400" b="1" dirty="0"/>
               <a:t>WAIT!! What is a coronavirus?</a:t>
             </a:r>
           </a:p>
           <a:p>
             <a:r>
-              <a:rPr lang="en-US" dirty="0"/>
-              <a:t>      okay</a:t>
-            </a:r>
-            <a:r>
-              <a:rPr lang="en-US"/>
-              <a:t>, </a:t>
-            </a:r>
-            <a:endParaRPr lang="en-US" dirty="0"/>
+              <a:rPr lang="en-US" sz="2400" dirty="0"/>
+              <a:t>      Coronaviruses are viruses that are name fir the crown-like spikes on their surfaces.</a:t>
+            </a:r>
+          </a:p>
+          <a:p>
+            <a:endParaRPr lang="en-US" sz="2400" dirty="0"/>
+          </a:p>
+          <a:p>
+            <a:r>
+              <a:rPr lang="en-US" sz="2400" dirty="0"/>
+              <a:t>There are coronaviruses that cause disease in humans and in animals.</a:t>
+            </a:r>
+          </a:p>
+          <a:p>
+            <a:endParaRPr lang="en-US" sz="2400" dirty="0"/>
+          </a:p>
+          <a:p>
+            <a:r>
+              <a:rPr lang="en-US" sz="2400" dirty="0"/>
+              <a:t>Sometimes animal corona viruses evolve and become a new human coronavirus. </a:t>
+            </a:r>
+          </a:p>
+          <a:p>
+            <a:r>
+              <a:rPr lang="en-US" sz="2400" dirty="0"/>
+              <a:t>For example </a:t>
+            </a:r>
+            <a:r>
+              <a:rPr lang="en-US" sz="2400" b="1" dirty="0"/>
+              <a:t>SARS from 2003 </a:t>
+            </a:r>
+            <a:r>
+              <a:rPr lang="en-US" sz="2400" dirty="0"/>
+              <a:t>and now </a:t>
+            </a:r>
+            <a:r>
+              <a:rPr lang="en-US" sz="2400" b="1" dirty="0"/>
+              <a:t>COVID-19</a:t>
+            </a:r>
           </a:p>
         </p:txBody>
       </p:sp>
@@ -3897,7 +4467,7 @@
         </p:blipFill>
         <p:spPr>
           <a:xfrm>
-            <a:off x="5673168" y="1022783"/>
+            <a:off x="5673168" y="1256765"/>
             <a:ext cx="7517944" cy="4249727"/>
           </a:xfrm>
         </p:spPr>
@@ -3916,8 +4486,8 @@
         </p:nvSpPr>
         <p:spPr>
           <a:xfrm>
-            <a:off x="731520" y="1083212"/>
-            <a:ext cx="4529797" cy="923330"/>
+            <a:off x="731520" y="1351508"/>
+            <a:ext cx="5364480" cy="4154984"/>
           </a:xfrm>
           <a:prstGeom prst="rect">
             <a:avLst/>
@@ -3931,25 +4501,34 @@
           <a:lstStyle/>
           <a:p>
             <a:r>
-              <a:rPr lang="en-US" dirty="0"/>
-              <a:t>COVID-19 is a kind of </a:t>
-            </a:r>
-            <a:r>
-              <a:rPr lang="en-US" dirty="0" err="1"/>
-              <a:t>cornonavirus</a:t>
-            </a:r>
-            <a:r>
-              <a:rPr lang="en-US" dirty="0"/>
-              <a:t> …</a:t>
-            </a:r>
-          </a:p>
-          <a:p>
-            <a:endParaRPr lang="en-US" dirty="0"/>
-          </a:p>
-          <a:p>
-            <a:r>
-              <a:rPr lang="en-US" dirty="0"/>
-              <a:t>WAIT!! What is a coronavirus</a:t>
+              <a:rPr lang="en-US" sz="2400" dirty="0"/>
+              <a:t>It is caused by a novel coronavirus, named Severe Acute Respiratory Syndrome coronavirus 2 </a:t>
+            </a:r>
+            <a:r>
+              <a:rPr lang="en-US" sz="2400" b="1" dirty="0"/>
+              <a:t>(SARS-CoV-2). </a:t>
+            </a:r>
+          </a:p>
+          <a:p>
+            <a:endParaRPr lang="en-US" sz="2400" dirty="0"/>
+          </a:p>
+          <a:p>
+            <a:r>
+              <a:rPr lang="en-US" sz="2400" dirty="0"/>
+              <a:t> It was identified as the cause of an outbreak of respiratory illness first detected in Wuhan China in 2019. </a:t>
+            </a:r>
+          </a:p>
+          <a:p>
+            <a:endParaRPr lang="en-US" sz="2400" dirty="0"/>
+          </a:p>
+          <a:p>
+            <a:r>
+              <a:rPr lang="en-US" sz="2400" dirty="0"/>
+              <a:t>The illness caused by the virus has been named coronavirus disease 2019   </a:t>
+            </a:r>
+            <a:r>
+              <a:rPr lang="en-US" sz="2400" b="1" dirty="0"/>
+              <a:t>(COVID-19).</a:t>
             </a:r>
           </a:p>
         </p:txBody>
@@ -3958,6 +4537,451 @@
     <p:extLst>
       <p:ext uri="{BB962C8B-B14F-4D97-AF65-F5344CB8AC3E}">
         <p14:creationId xmlns:p14="http://schemas.microsoft.com/office/powerpoint/2010/main" val="3382649048"/>
+      </p:ext>
+    </p:extLst>
+  </p:cSld>
+  <p:clrMapOvr>
+    <a:masterClrMapping/>
+  </p:clrMapOvr>
+</p:sld>
+</file>
+
+<file path=ppt/slides/slide5.xml><?xml version="1.0" encoding="utf-8"?>
+<p:sld xmlns:a="http://schemas.openxmlformats.org/drawingml/2006/main" xmlns:r="http://schemas.openxmlformats.org/officeDocument/2006/relationships" xmlns:p="http://schemas.openxmlformats.org/presentationml/2006/main">
+  <p:cSld>
+    <p:spTree>
+      <p:nvGrpSpPr>
+        <p:cNvPr id="1" name=""/>
+        <p:cNvGrpSpPr/>
+        <p:nvPr/>
+      </p:nvGrpSpPr>
+      <p:grpSpPr>
+        <a:xfrm>
+          <a:off x="0" y="0"/>
+          <a:ext cx="0" cy="0"/>
+          <a:chOff x="0" y="0"/>
+          <a:chExt cx="0" cy="0"/>
+        </a:xfrm>
+      </p:grpSpPr>
+      <p:sp>
+        <p:nvSpPr>
+          <p:cNvPr id="2" name="Title 1">
+            <a:extLst>
+              <a:ext uri="{FF2B5EF4-FFF2-40B4-BE49-F238E27FC236}">
+                <a16:creationId xmlns:a16="http://schemas.microsoft.com/office/drawing/2014/main" id="{34EB9AAA-5BEB-4CE6-AFB1-6C785AB4BE46}"/>
+              </a:ext>
+            </a:extLst>
+          </p:cNvPr>
+          <p:cNvSpPr>
+            <a:spLocks noGrp="1"/>
+          </p:cNvSpPr>
+          <p:nvPr>
+            <p:ph type="title"/>
+          </p:nvPr>
+        </p:nvSpPr>
+        <p:spPr>
+          <a:xfrm>
+            <a:off x="838200" y="0"/>
+            <a:ext cx="10515600" cy="1325563"/>
+          </a:xfrm>
+        </p:spPr>
+        <p:txBody>
+          <a:bodyPr/>
+          <a:lstStyle/>
+          <a:p>
+            <a:r>
+              <a:rPr lang="en-US" dirty="0"/>
+              <a:t>What is COVID-19</a:t>
+            </a:r>
+          </a:p>
+        </p:txBody>
+      </p:sp>
+      <p:pic>
+        <p:nvPicPr>
+          <p:cNvPr id="5" name="Content Placeholder 4" descr="A close up of a flower&#10;&#10;Description automatically generated">
+            <a:extLst>
+              <a:ext uri="{FF2B5EF4-FFF2-40B4-BE49-F238E27FC236}">
+                <a16:creationId xmlns:a16="http://schemas.microsoft.com/office/drawing/2014/main" id="{BDCAFEEB-75DC-49D0-B3E3-22E58EFFA359}"/>
+              </a:ext>
+            </a:extLst>
+          </p:cNvPr>
+          <p:cNvPicPr>
+            <a:picLocks noGrp="1" noChangeAspect="1"/>
+          </p:cNvPicPr>
+          <p:nvPr>
+            <p:ph idx="1"/>
+          </p:nvPr>
+        </p:nvPicPr>
+        <p:blipFill>
+          <a:blip r:embed="rId2">
+            <a:extLst>
+              <a:ext uri="{BEBA8EAE-BF5A-486C-A8C5-ECC9F3942E4B}">
+                <a14:imgProps xmlns:a14="http://schemas.microsoft.com/office/drawing/2010/main">
+                  <a14:imgLayer r:embed="rId3">
+                    <a14:imgEffect>
+                      <a14:backgroundRemoval t="4177" b="98526" l="2917" r="90000">
+                        <a14:foregroundMark x1="44444" y1="19656" x2="18056" y2="19165"/>
+                        <a14:foregroundMark x1="18056" y1="19165" x2="24583" y2="14988"/>
+                        <a14:foregroundMark x1="24583" y1="14988" x2="17917" y2="16462"/>
+                        <a14:foregroundMark x1="17917" y1="16462" x2="21667" y2="17199"/>
+                        <a14:foregroundMark x1="16806" y1="14988" x2="18056" y2="16953"/>
+                        <a14:foregroundMark x1="14167" y1="18673" x2="18472" y2="18673"/>
+                        <a14:foregroundMark x1="13472" y1="16462" x2="17361" y2="16462"/>
+                        <a14:foregroundMark x1="14028" y1="16216" x2="17778" y2="16216"/>
+                        <a14:foregroundMark x1="22639" y1="18182" x2="26667" y2="18182"/>
+                        <a14:foregroundMark x1="44861" y1="19902" x2="35556" y2="19902"/>
+                        <a14:foregroundMark x1="43611" y1="18182" x2="36667" y2="18182"/>
+                        <a14:foregroundMark x1="42639" y1="17199" x2="38472" y2="17199"/>
+                        <a14:foregroundMark x1="46389" y1="12285" x2="52639" y2="8600"/>
+                        <a14:foregroundMark x1="52639" y1="8600" x2="52778" y2="8600"/>
+                        <a14:foregroundMark x1="45833" y1="7371" x2="49306" y2="5897"/>
+                        <a14:foregroundMark x1="77222" y1="47912" x2="75139" y2="62899"/>
+                        <a14:foregroundMark x1="53333" y1="89681" x2="60000" y2="89681"/>
+                        <a14:foregroundMark x1="60000" y1="89681" x2="65000" y2="89435"/>
+                        <a14:foregroundMark x1="46111" y1="90172" x2="50833" y2="90172"/>
+                        <a14:foregroundMark x1="48056" y1="92383" x2="49583" y2="92383"/>
+                        <a14:foregroundMark x1="83611" y1="53071" x2="84722" y2="59214"/>
+                        <a14:foregroundMark x1="82222" y1="42015" x2="84167" y2="38821"/>
+                        <a14:foregroundMark x1="15833" y1="33415" x2="23889" y2="36364"/>
+                        <a14:foregroundMark x1="15139" y1="49386" x2="22222" y2="50614"/>
+                        <a14:foregroundMark x1="15694" y1="52088" x2="30139" y2="53071"/>
+                        <a14:foregroundMark x1="32083" y1="52580" x2="23889" y2="52580"/>
+                        <a14:foregroundMark x1="22361" y1="37838" x2="34167" y2="38084"/>
+                        <a14:foregroundMark x1="23750" y1="37101" x2="31944" y2="37346"/>
+                        <a14:foregroundMark x1="25833" y1="18182" x2="32222" y2="18182"/>
+                        <a14:foregroundMark x1="32222" y1="18182" x2="26389" y2="19165"/>
+                        <a14:foregroundMark x1="32083" y1="17936" x2="31250" y2="19165"/>
+                        <a14:foregroundMark x1="30942" y1="87469" x2="33056" y2="87469"/>
+                        <a14:foregroundMark x1="9813" y1="95390" x2="10000" y2="95086"/>
+                        <a14:foregroundMark x1="8889" y1="91892" x2="24306" y2="92383"/>
+                        <a14:foregroundMark x1="24306" y1="92383" x2="26111" y2="91155"/>
+                        <a14:foregroundMark x1="7778" y1="87715" x2="15000" y2="87715"/>
+                        <a14:foregroundMark x1="15000" y1="87715" x2="25972" y2="87469"/>
+                        <a14:foregroundMark x1="25972" y1="94349" x2="26944" y2="87715"/>
+                        <a14:foregroundMark x1="26944" y1="86732" x2="28889" y2="86486"/>
+                        <a14:foregroundMark x1="26528" y1="86241" x2="28750" y2="86241"/>
+                        <a14:foregroundMark x1="57222" y1="4177" x2="63889" y2="6388"/>
+                        <a14:foregroundMark x1="63889" y1="6388" x2="58472" y2="4177"/>
+                        <a14:foregroundMark x1="58472" y1="4177" x2="58472" y2="4177"/>
+                        <a14:foregroundMark x1="16806" y1="84767" x2="9722" y2="84767"/>
+                        <a14:foregroundMark x1="9722" y1="84767" x2="16250" y2="84767"/>
+                        <a14:foregroundMark x1="16250" y1="84767" x2="29722" y2="83784"/>
+                        <a14:foregroundMark x1="29722" y1="83784" x2="29722" y2="83784"/>
+                        <a14:foregroundMark x1="29861" y1="84767" x2="30833" y2="96560"/>
+                        <a14:foregroundMark x1="30833" y1="96560" x2="10139" y2="99509"/>
+                        <a14:foregroundMark x1="10139" y1="99509" x2="6389" y2="89435"/>
+                        <a14:foregroundMark x1="6389" y1="89435" x2="9722" y2="83784"/>
+                        <a14:foregroundMark x1="9722" y1="83292" x2="5417" y2="91892"/>
+                        <a14:foregroundMark x1="5417" y1="91892" x2="9861" y2="98771"/>
+                        <a14:foregroundMark x1="7778" y1="85749" x2="8750" y2="90909"/>
+                        <a14:foregroundMark x1="8750" y1="83784" x2="2917" y2="87224"/>
+                        <a14:backgroundMark x1="43447" y1="16865" x2="45556" y2="6143"/>
+                        <a14:backgroundMark x1="49315" y1="5866" x2="52222" y2="5651"/>
+                        <a14:backgroundMark x1="45556" y1="6143" x2="46233" y2="6093"/>
+                        <a14:backgroundMark x1="58345" y1="942" x2="58611" y2="737"/>
+                        <a14:backgroundMark x1="52222" y1="5651" x2="57628" y2="1493"/>
+                        <a14:backgroundMark x1="58611" y1="737" x2="65139" y2="1966"/>
+                        <a14:backgroundMark x1="65139" y1="1966" x2="67778" y2="12531"/>
+                        <a14:backgroundMark x1="67778" y1="12531" x2="74444" y2="8845"/>
+                        <a14:backgroundMark x1="84581" y1="37121" x2="85278" y2="39066"/>
+                        <a14:backgroundMark x1="74444" y1="8845" x2="84292" y2="36314"/>
+                        <a14:backgroundMark x1="85278" y1="39066" x2="81111" y2="47912"/>
+                        <a14:backgroundMark x1="81111" y1="47912" x2="82743" y2="53547"/>
+                        <a14:backgroundMark x1="83776" y1="59732" x2="82361" y2="69533"/>
+                        <a14:backgroundMark x1="82361" y1="69533" x2="81944" y2="68305"/>
+                        <a14:backgroundMark x1="13583" y1="16154" x2="11806" y2="16216"/>
+                        <a14:backgroundMark x1="11806" y1="16216" x2="13441" y2="16550"/>
+                        <a14:backgroundMark x1="3889" y1="18673" x2="1250" y2="74447"/>
+                      </a14:backgroundRemoval>
+                    </a14:imgEffect>
+                  </a14:imgLayer>
+                </a14:imgProps>
+              </a:ext>
+              <a:ext uri="{28A0092B-C50C-407E-A947-70E740481C1C}">
+                <a14:useLocalDpi xmlns:a14="http://schemas.microsoft.com/office/drawing/2010/main" val="0"/>
+              </a:ext>
+            </a:extLst>
+          </a:blip>
+          <a:stretch>
+            <a:fillRect/>
+          </a:stretch>
+        </p:blipFill>
+        <p:spPr>
+          <a:xfrm>
+            <a:off x="5673168" y="1256765"/>
+            <a:ext cx="7517944" cy="4249727"/>
+          </a:xfrm>
+        </p:spPr>
+      </p:pic>
+      <p:sp>
+        <p:nvSpPr>
+          <p:cNvPr id="3" name="TextBox 2">
+            <a:extLst>
+              <a:ext uri="{FF2B5EF4-FFF2-40B4-BE49-F238E27FC236}">
+                <a16:creationId xmlns:a16="http://schemas.microsoft.com/office/drawing/2014/main" id="{740F2699-66B0-4B6D-ABC2-50E722CF656F}"/>
+              </a:ext>
+            </a:extLst>
+          </p:cNvPr>
+          <p:cNvSpPr txBox="1"/>
+          <p:nvPr/>
+        </p:nvSpPr>
+        <p:spPr>
+          <a:xfrm>
+            <a:off x="524933" y="2082800"/>
+            <a:ext cx="5148235" cy="2677656"/>
+          </a:xfrm>
+          <a:prstGeom prst="rect">
+            <a:avLst/>
+          </a:prstGeom>
+          <a:noFill/>
+        </p:spPr>
+        <p:txBody>
+          <a:bodyPr wrap="square" rtlCol="0">
+            <a:spAutoFit/>
+          </a:bodyPr>
+          <a:lstStyle/>
+          <a:p>
+            <a:r>
+              <a:rPr lang="en-US" sz="2400" dirty="0"/>
+              <a:t>SARS-CoV-2 is presumed to have been transmitted through bats, but this has not been confirmed. So the origin is still </a:t>
+            </a:r>
+            <a:r>
+              <a:rPr lang="en-US" sz="2400" b="1" dirty="0"/>
+              <a:t>unknown </a:t>
+            </a:r>
+          </a:p>
+          <a:p>
+            <a:endParaRPr lang="en-US" sz="2400" b="1" dirty="0"/>
+          </a:p>
+          <a:p>
+            <a:r>
+              <a:rPr lang="en-US" sz="2400" dirty="0"/>
+              <a:t>There is currently no vaccine for coronaviruses. </a:t>
+            </a:r>
+          </a:p>
+        </p:txBody>
+      </p:sp>
+    </p:spTree>
+    <p:extLst>
+      <p:ext uri="{BB962C8B-B14F-4D97-AF65-F5344CB8AC3E}">
+        <p14:creationId xmlns:p14="http://schemas.microsoft.com/office/powerpoint/2010/main" val="3763892335"/>
+      </p:ext>
+    </p:extLst>
+  </p:cSld>
+  <p:clrMapOvr>
+    <a:masterClrMapping/>
+  </p:clrMapOvr>
+</p:sld>
+</file>
+
+<file path=ppt/slides/slide6.xml><?xml version="1.0" encoding="utf-8"?>
+<p:sld xmlns:a="http://schemas.openxmlformats.org/drawingml/2006/main" xmlns:r="http://schemas.openxmlformats.org/officeDocument/2006/relationships" xmlns:p="http://schemas.openxmlformats.org/presentationml/2006/main">
+  <p:cSld>
+    <p:spTree>
+      <p:nvGrpSpPr>
+        <p:cNvPr id="1" name=""/>
+        <p:cNvGrpSpPr/>
+        <p:nvPr/>
+      </p:nvGrpSpPr>
+      <p:grpSpPr>
+        <a:xfrm>
+          <a:off x="0" y="0"/>
+          <a:ext cx="0" cy="0"/>
+          <a:chOff x="0" y="0"/>
+          <a:chExt cx="0" cy="0"/>
+        </a:xfrm>
+      </p:grpSpPr>
+      <p:sp>
+        <p:nvSpPr>
+          <p:cNvPr id="2" name="Title 1">
+            <a:extLst>
+              <a:ext uri="{FF2B5EF4-FFF2-40B4-BE49-F238E27FC236}">
+                <a16:creationId xmlns:a16="http://schemas.microsoft.com/office/drawing/2014/main" id="{EBDBA0B3-9761-496D-BE50-CBBF4D707068}"/>
+              </a:ext>
+            </a:extLst>
+          </p:cNvPr>
+          <p:cNvSpPr>
+            <a:spLocks noGrp="1"/>
+          </p:cNvSpPr>
+          <p:nvPr>
+            <p:ph type="title"/>
+          </p:nvPr>
+        </p:nvSpPr>
+        <p:spPr>
+          <a:xfrm>
+            <a:off x="838200" y="-125763"/>
+            <a:ext cx="10515600" cy="1325563"/>
+          </a:xfrm>
+        </p:spPr>
+        <p:txBody>
+          <a:bodyPr/>
+          <a:lstStyle/>
+          <a:p>
+            <a:pPr algn="ctr"/>
+            <a:r>
+              <a:rPr lang="en-US" dirty="0"/>
+              <a:t>IMPACT OF COVID-19 </a:t>
+            </a:r>
+          </a:p>
+        </p:txBody>
+      </p:sp>
+      <p:pic>
+        <p:nvPicPr>
+          <p:cNvPr id="5" name="Content Placeholder 4" descr="A screen shot of a computer&#10;&#10;Description automatically generated">
+            <a:extLst>
+              <a:ext uri="{FF2B5EF4-FFF2-40B4-BE49-F238E27FC236}">
+                <a16:creationId xmlns:a16="http://schemas.microsoft.com/office/drawing/2014/main" id="{85C9F263-6881-40BC-8889-7777F391537E}"/>
+              </a:ext>
+            </a:extLst>
+          </p:cNvPr>
+          <p:cNvPicPr>
+            <a:picLocks noGrp="1" noChangeAspect="1"/>
+          </p:cNvPicPr>
+          <p:nvPr>
+            <p:ph idx="1"/>
+          </p:nvPr>
+        </p:nvPicPr>
+        <p:blipFill>
+          <a:blip r:embed="rId3">
+            <a:extLst>
+              <a:ext uri="{28A0092B-C50C-407E-A947-70E740481C1C}">
+                <a14:useLocalDpi xmlns:a14="http://schemas.microsoft.com/office/drawing/2010/main" val="0"/>
+              </a:ext>
+            </a:extLst>
+          </a:blip>
+          <a:stretch>
+            <a:fillRect/>
+          </a:stretch>
+        </p:blipFill>
+        <p:spPr>
+          <a:xfrm>
+            <a:off x="0" y="1069315"/>
+            <a:ext cx="12192000" cy="4901275"/>
+          </a:xfrm>
+        </p:spPr>
+      </p:pic>
+    </p:spTree>
+    <p:extLst>
+      <p:ext uri="{BB962C8B-B14F-4D97-AF65-F5344CB8AC3E}">
+        <p14:creationId xmlns:p14="http://schemas.microsoft.com/office/powerpoint/2010/main" val="1226178468"/>
+      </p:ext>
+    </p:extLst>
+  </p:cSld>
+  <p:clrMapOvr>
+    <a:masterClrMapping/>
+  </p:clrMapOvr>
+</p:sld>
+</file>
+
+<file path=ppt/slides/slide7.xml><?xml version="1.0" encoding="utf-8"?>
+<p:sld xmlns:a="http://schemas.openxmlformats.org/drawingml/2006/main" xmlns:r="http://schemas.openxmlformats.org/officeDocument/2006/relationships" xmlns:p="http://schemas.openxmlformats.org/presentationml/2006/main">
+  <p:cSld>
+    <p:spTree>
+      <p:nvGrpSpPr>
+        <p:cNvPr id="1" name=""/>
+        <p:cNvGrpSpPr/>
+        <p:nvPr/>
+      </p:nvGrpSpPr>
+      <p:grpSpPr>
+        <a:xfrm>
+          <a:off x="0" y="0"/>
+          <a:ext cx="0" cy="0"/>
+          <a:chOff x="0" y="0"/>
+          <a:chExt cx="0" cy="0"/>
+        </a:xfrm>
+      </p:grpSpPr>
+      <p:sp>
+        <p:nvSpPr>
+          <p:cNvPr id="2" name="Title 1">
+            <a:extLst>
+              <a:ext uri="{FF2B5EF4-FFF2-40B4-BE49-F238E27FC236}">
+                <a16:creationId xmlns:a16="http://schemas.microsoft.com/office/drawing/2014/main" id="{2385F15A-0D6A-4078-B7AC-40B46686C7DE}"/>
+              </a:ext>
+            </a:extLst>
+          </p:cNvPr>
+          <p:cNvSpPr>
+            <a:spLocks noGrp="1"/>
+          </p:cNvSpPr>
+          <p:nvPr>
+            <p:ph type="title"/>
+          </p:nvPr>
+        </p:nvSpPr>
+        <p:spPr/>
+        <p:txBody>
+          <a:bodyPr/>
+          <a:lstStyle/>
+          <a:p>
+            <a:r>
+              <a:rPr lang="en-US" dirty="0"/>
+              <a:t>Sources </a:t>
+            </a:r>
+          </a:p>
+        </p:txBody>
+      </p:sp>
+      <p:sp>
+        <p:nvSpPr>
+          <p:cNvPr id="3" name="Content Placeholder 2">
+            <a:extLst>
+              <a:ext uri="{FF2B5EF4-FFF2-40B4-BE49-F238E27FC236}">
+                <a16:creationId xmlns:a16="http://schemas.microsoft.com/office/drawing/2014/main" id="{81D600BF-F155-407F-ACE0-F887C21236EE}"/>
+              </a:ext>
+            </a:extLst>
+          </p:cNvPr>
+          <p:cNvSpPr>
+            <a:spLocks noGrp="1"/>
+          </p:cNvSpPr>
+          <p:nvPr>
+            <p:ph idx="1"/>
+          </p:nvPr>
+        </p:nvSpPr>
+        <p:spPr/>
+        <p:txBody>
+          <a:bodyPr>
+            <a:normAutofit/>
+          </a:bodyPr>
+          <a:lstStyle/>
+          <a:p>
+            <a:pPr marL="0" indent="0">
+              <a:buNone/>
+            </a:pPr>
+            <a:r>
+              <a:rPr lang="en-US" sz="2000" dirty="0"/>
+              <a:t>Coronavirus</a:t>
+            </a:r>
+          </a:p>
+          <a:p>
+            <a:r>
+              <a:rPr lang="en-US" sz="2000" dirty="0">
+                <a:hlinkClick r:id="rId2"/>
+              </a:rPr>
+              <a:t>https://www.cdc.gov/coronavirus/types.html</a:t>
+            </a:r>
+            <a:endParaRPr lang="en-US" sz="2000" dirty="0"/>
+          </a:p>
+          <a:p>
+            <a:r>
+              <a:rPr lang="en-US" sz="2000" dirty="0">
+                <a:hlinkClick r:id="rId3"/>
+              </a:rPr>
+              <a:t>https://www.cdc.gov/media/subtopic/images.htm</a:t>
+            </a:r>
+            <a:endParaRPr lang="en-US" sz="2000" dirty="0"/>
+          </a:p>
+          <a:p>
+            <a:r>
+              <a:rPr lang="en-US" sz="2000" dirty="0">
+                <a:hlinkClick r:id="rId4"/>
+              </a:rPr>
+              <a:t>https://coronavirus.jhu.edu/map.html</a:t>
+            </a:r>
+            <a:endParaRPr lang="en-US" sz="2000" dirty="0"/>
+          </a:p>
+        </p:txBody>
+      </p:sp>
+    </p:spTree>
+    <p:extLst>
+      <p:ext uri="{BB962C8B-B14F-4D97-AF65-F5344CB8AC3E}">
+        <p14:creationId xmlns:p14="http://schemas.microsoft.com/office/powerpoint/2010/main" val="1276680627"/>
       </p:ext>
     </p:extLst>
   </p:cSld>
@@ -4260,4 +5284,299 @@
     </a:ext>
   </a:extLst>
 </a:theme>
+</file>
+
+<file path=ppt/theme/theme2.xml><?xml version="1.0" encoding="utf-8"?>
+<a:theme xmlns:a="http://schemas.openxmlformats.org/drawingml/2006/main" name="Office Theme">
+  <a:themeElements>
+    <a:clrScheme name="Office">
+      <a:dk1>
+        <a:sysClr val="windowText" lastClr="000000"/>
+      </a:dk1>
+      <a:lt1>
+        <a:sysClr val="window" lastClr="FFFFFF"/>
+      </a:lt1>
+      <a:dk2>
+        <a:srgbClr val="44546A"/>
+      </a:dk2>
+      <a:lt2>
+        <a:srgbClr val="E7E6E6"/>
+      </a:lt2>
+      <a:accent1>
+        <a:srgbClr val="4472C4"/>
+      </a:accent1>
+      <a:accent2>
+        <a:srgbClr val="ED7D31"/>
+      </a:accent2>
+      <a:accent3>
+        <a:srgbClr val="A5A5A5"/>
+      </a:accent3>
+      <a:accent4>
+        <a:srgbClr val="FFC000"/>
+      </a:accent4>
+      <a:accent5>
+        <a:srgbClr val="5B9BD5"/>
+      </a:accent5>
+      <a:accent6>
+        <a:srgbClr val="70AD47"/>
+      </a:accent6>
+      <a:hlink>
+        <a:srgbClr val="0563C1"/>
+      </a:hlink>
+      <a:folHlink>
+        <a:srgbClr val="954F72"/>
+      </a:folHlink>
+    </a:clrScheme>
+    <a:fontScheme name="Office">
+      <a:majorFont>
+        <a:latin typeface="Calibri Light" panose="020F0302020204030204"/>
+        <a:ea typeface=""/>
+        <a:cs typeface=""/>
+        <a:font script="Jpan" typeface="游ゴシック Light"/>
+        <a:font script="Hang" typeface="맑은 고딕"/>
+        <a:font script="Hans" typeface="等线 Light"/>
+        <a:font script="Hant" typeface="新細明體"/>
+        <a:font script="Arab" typeface="Times New Roman"/>
+        <a:font script="Hebr" typeface="Times New Roman"/>
+        <a:font script="Thai" typeface="Angsana New"/>
+        <a:font script="Ethi" typeface="Nyala"/>
+        <a:font script="Beng" typeface="Vrinda"/>
+        <a:font script="Gujr" typeface="Shruti"/>
+        <a:font script="Khmr" typeface="MoolBoran"/>
+        <a:font script="Knda" typeface="Tunga"/>
+        <a:font script="Guru" typeface="Raavi"/>
+        <a:font script="Cans" typeface="Euphemia"/>
+        <a:font script="Cher" typeface="Plantagenet Cherokee"/>
+        <a:font script="Yiii" typeface="Microsoft Yi Baiti"/>
+        <a:font script="Tibt" typeface="Microsoft Himalaya"/>
+        <a:font script="Thaa" typeface="MV Boli"/>
+        <a:font script="Deva" typeface="Mangal"/>
+        <a:font script="Telu" typeface="Gautami"/>
+        <a:font script="Taml" typeface="Latha"/>
+        <a:font script="Syrc" typeface="Estrangelo Edessa"/>
+        <a:font script="Orya" typeface="Kalinga"/>
+        <a:font script="Mlym" typeface="Kartika"/>
+        <a:font script="Laoo" typeface="DokChampa"/>
+        <a:font script="Sinh" typeface="Iskoola Pota"/>
+        <a:font script="Mong" typeface="Mongolian Baiti"/>
+        <a:font script="Viet" typeface="Times New Roman"/>
+        <a:font script="Uigh" typeface="Microsoft Uighur"/>
+        <a:font script="Geor" typeface="Sylfaen"/>
+        <a:font script="Armn" typeface="Arial"/>
+        <a:font script="Bugi" typeface="Leelawadee UI"/>
+        <a:font script="Bopo" typeface="Microsoft JhengHei"/>
+        <a:font script="Java" typeface="Javanese Text"/>
+        <a:font script="Lisu" typeface="Segoe UI"/>
+        <a:font script="Mymr" typeface="Myanmar Text"/>
+        <a:font script="Nkoo" typeface="Ebrima"/>
+        <a:font script="Olck" typeface="Nirmala UI"/>
+        <a:font script="Osma" typeface="Ebrima"/>
+        <a:font script="Phag" typeface="Phagspa"/>
+        <a:font script="Syrn" typeface="Estrangelo Edessa"/>
+        <a:font script="Syrj" typeface="Estrangelo Edessa"/>
+        <a:font script="Syre" typeface="Estrangelo Edessa"/>
+        <a:font script="Sora" typeface="Nirmala UI"/>
+        <a:font script="Tale" typeface="Microsoft Tai Le"/>
+        <a:font script="Talu" typeface="Microsoft New Tai Lue"/>
+        <a:font script="Tfng" typeface="Ebrima"/>
+      </a:majorFont>
+      <a:minorFont>
+        <a:latin typeface="Calibri" panose="020F0502020204030204"/>
+        <a:ea typeface=""/>
+        <a:cs typeface=""/>
+        <a:font script="Jpan" typeface="游ゴシック"/>
+        <a:font script="Hang" typeface="맑은 고딕"/>
+        <a:font script="Hans" typeface="等线"/>
+        <a:font script="Hant" typeface="新細明體"/>
+        <a:font script="Arab" typeface="Arial"/>
+        <a:font script="Hebr" typeface="Arial"/>
+        <a:font script="Thai" typeface="Cordia New"/>
+        <a:font script="Ethi" typeface="Nyala"/>
+        <a:font script="Beng" typeface="Vrinda"/>
+        <a:font script="Gujr" typeface="Shruti"/>
+        <a:font script="Khmr" typeface="DaunPenh"/>
+        <a:font script="Knda" typeface="Tunga"/>
+        <a:font script="Guru" typeface="Raavi"/>
+        <a:font script="Cans" typeface="Euphemia"/>
+        <a:font script="Cher" typeface="Plantagenet Cherokee"/>
+        <a:font script="Yiii" typeface="Microsoft Yi Baiti"/>
+        <a:font script="Tibt" typeface="Microsoft Himalaya"/>
+        <a:font script="Thaa" typeface="MV Boli"/>
+        <a:font script="Deva" typeface="Mangal"/>
+        <a:font script="Telu" typeface="Gautami"/>
+        <a:font script="Taml" typeface="Latha"/>
+        <a:font script="Syrc" typeface="Estrangelo Edessa"/>
+        <a:font script="Orya" typeface="Kalinga"/>
+        <a:font script="Mlym" typeface="Kartika"/>
+        <a:font script="Laoo" typeface="DokChampa"/>
+        <a:font script="Sinh" typeface="Iskoola Pota"/>
+        <a:font script="Mong" typeface="Mongolian Baiti"/>
+        <a:font script="Viet" typeface="Arial"/>
+        <a:font script="Uigh" typeface="Microsoft Uighur"/>
+        <a:font script="Geor" typeface="Sylfaen"/>
+        <a:font script="Armn" typeface="Arial"/>
+        <a:font script="Bugi" typeface="Leelawadee UI"/>
+        <a:font script="Bopo" typeface="Microsoft JhengHei"/>
+        <a:font script="Java" typeface="Javanese Text"/>
+        <a:font script="Lisu" typeface="Segoe UI"/>
+        <a:font script="Mymr" typeface="Myanmar Text"/>
+        <a:font script="Nkoo" typeface="Ebrima"/>
+        <a:font script="Olck" typeface="Nirmala UI"/>
+        <a:font script="Osma" typeface="Ebrima"/>
+        <a:font script="Phag" typeface="Phagspa"/>
+        <a:font script="Syrn" typeface="Estrangelo Edessa"/>
+        <a:font script="Syrj" typeface="Estrangelo Edessa"/>
+        <a:font script="Syre" typeface="Estrangelo Edessa"/>
+        <a:font script="Sora" typeface="Nirmala UI"/>
+        <a:font script="Tale" typeface="Microsoft Tai Le"/>
+        <a:font script="Talu" typeface="Microsoft New Tai Lue"/>
+        <a:font script="Tfng" typeface="Ebrima"/>
+      </a:minorFont>
+    </a:fontScheme>
+    <a:fmtScheme name="Office">
+      <a:fillStyleLst>
+        <a:solidFill>
+          <a:schemeClr val="phClr"/>
+        </a:solidFill>
+        <a:gradFill rotWithShape="1">
+          <a:gsLst>
+            <a:gs pos="0">
+              <a:schemeClr val="phClr">
+                <a:lumMod val="110000"/>
+                <a:satMod val="105000"/>
+                <a:tint val="67000"/>
+              </a:schemeClr>
+            </a:gs>
+            <a:gs pos="50000">
+              <a:schemeClr val="phClr">
+                <a:lumMod val="105000"/>
+                <a:satMod val="103000"/>
+                <a:tint val="73000"/>
+              </a:schemeClr>
+            </a:gs>
+            <a:gs pos="100000">
+              <a:schemeClr val="phClr">
+                <a:lumMod val="105000"/>
+                <a:satMod val="109000"/>
+                <a:tint val="81000"/>
+              </a:schemeClr>
+            </a:gs>
+          </a:gsLst>
+          <a:lin ang="5400000" scaled="0"/>
+        </a:gradFill>
+        <a:gradFill rotWithShape="1">
+          <a:gsLst>
+            <a:gs pos="0">
+              <a:schemeClr val="phClr">
+                <a:satMod val="103000"/>
+                <a:lumMod val="102000"/>
+                <a:tint val="94000"/>
+              </a:schemeClr>
+            </a:gs>
+            <a:gs pos="50000">
+              <a:schemeClr val="phClr">
+                <a:satMod val="110000"/>
+                <a:lumMod val="100000"/>
+                <a:shade val="100000"/>
+              </a:schemeClr>
+            </a:gs>
+            <a:gs pos="100000">
+              <a:schemeClr val="phClr">
+                <a:lumMod val="99000"/>
+                <a:satMod val="120000"/>
+                <a:shade val="78000"/>
+              </a:schemeClr>
+            </a:gs>
+          </a:gsLst>
+          <a:lin ang="5400000" scaled="0"/>
+        </a:gradFill>
+      </a:fillStyleLst>
+      <a:lnStyleLst>
+        <a:ln w="6350" cap="flat" cmpd="sng" algn="ctr">
+          <a:solidFill>
+            <a:schemeClr val="phClr"/>
+          </a:solidFill>
+          <a:prstDash val="solid"/>
+          <a:miter lim="800000"/>
+        </a:ln>
+        <a:ln w="12700" cap="flat" cmpd="sng" algn="ctr">
+          <a:solidFill>
+            <a:schemeClr val="phClr"/>
+          </a:solidFill>
+          <a:prstDash val="solid"/>
+          <a:miter lim="800000"/>
+        </a:ln>
+        <a:ln w="19050" cap="flat" cmpd="sng" algn="ctr">
+          <a:solidFill>
+            <a:schemeClr val="phClr"/>
+          </a:solidFill>
+          <a:prstDash val="solid"/>
+          <a:miter lim="800000"/>
+        </a:ln>
+      </a:lnStyleLst>
+      <a:effectStyleLst>
+        <a:effectStyle>
+          <a:effectLst/>
+        </a:effectStyle>
+        <a:effectStyle>
+          <a:effectLst/>
+        </a:effectStyle>
+        <a:effectStyle>
+          <a:effectLst>
+            <a:outerShdw blurRad="57150" dist="19050" dir="5400000" algn="ctr" rotWithShape="0">
+              <a:srgbClr val="000000">
+                <a:alpha val="63000"/>
+              </a:srgbClr>
+            </a:outerShdw>
+          </a:effectLst>
+        </a:effectStyle>
+      </a:effectStyleLst>
+      <a:bgFillStyleLst>
+        <a:solidFill>
+          <a:schemeClr val="phClr"/>
+        </a:solidFill>
+        <a:solidFill>
+          <a:schemeClr val="phClr">
+            <a:tint val="95000"/>
+            <a:satMod val="170000"/>
+          </a:schemeClr>
+        </a:solidFill>
+        <a:gradFill rotWithShape="1">
+          <a:gsLst>
+            <a:gs pos="0">
+              <a:schemeClr val="phClr">
+                <a:tint val="93000"/>
+                <a:satMod val="150000"/>
+                <a:shade val="98000"/>
+                <a:lumMod val="102000"/>
+              </a:schemeClr>
+            </a:gs>
+            <a:gs pos="50000">
+              <a:schemeClr val="phClr">
+                <a:tint val="98000"/>
+                <a:satMod val="130000"/>
+                <a:shade val="90000"/>
+                <a:lumMod val="103000"/>
+              </a:schemeClr>
+            </a:gs>
+            <a:gs pos="100000">
+              <a:schemeClr val="phClr">
+                <a:shade val="63000"/>
+                <a:satMod val="120000"/>
+              </a:schemeClr>
+            </a:gs>
+          </a:gsLst>
+          <a:lin ang="5400000" scaled="0"/>
+        </a:gradFill>
+      </a:bgFillStyleLst>
+    </a:fmtScheme>
+  </a:themeElements>
+  <a:objectDefaults/>
+  <a:extraClrSchemeLst/>
+  <a:extLst>
+    <a:ext uri="{05A4C25C-085E-4340-85A3-A5531E510DB2}">
+      <thm15:themeFamily xmlns:thm15="http://schemas.microsoft.com/office/thememl/2012/main" name="Office Theme" id="{62F939B6-93AF-4DB8-9C6B-D6C7DFDC589F}" vid="{4A3C46E8-61CC-4603-A589-7422A47A8E4A}"/>
+    </a:ext>
+  </a:extLst>
+</a:theme>
 </file>
</xml_diff>